<commit_message>
Implementation of the first-visit MC
Note that the mc.py code implements the first-visit MC learner, but not the lambda-return currently, because the lambda-return is every-visit.

Details:
1) The change to implement the first-visit MC impacts the Learner class in the learners/__init__.py file.
2) The Learner class has now a new parameter called alpha_update_type which defines whether the alpha values are updated at the first visit of the state or at every visit.
</commit_message>
<xml_diff>
--- a/RL-001-MemoryManagement/results/202004Apr30-ResultsTDLambda&MC-1DGridworld.pptx
+++ b/RL-001-MemoryManagement/results/202004Apr30-ResultsTDLambda&MC-1DGridworld.pptx
@@ -5,7 +5,7 @@
     <p:sldMasterId id="2147483648" r:id="rId1"/>
   </p:sldMasterIdLst>
   <p:notesMasterIdLst>
-    <p:notesMasterId r:id="rId19"/>
+    <p:notesMasterId r:id="rId21"/>
   </p:notesMasterIdLst>
   <p:sldIdLst>
     <p:sldId id="256" r:id="rId2"/>
@@ -23,8 +23,10 @@
     <p:sldId id="268" r:id="rId14"/>
     <p:sldId id="262" r:id="rId15"/>
     <p:sldId id="266" r:id="rId16"/>
-    <p:sldId id="272" r:id="rId17"/>
-    <p:sldId id="273" r:id="rId18"/>
+    <p:sldId id="274" r:id="rId17"/>
+    <p:sldId id="275" r:id="rId18"/>
+    <p:sldId id="272" r:id="rId19"/>
+    <p:sldId id="273" r:id="rId20"/>
   </p:sldIdLst>
   <p:sldSz cx="9144000" cy="6858000" type="screen4x3"/>
   <p:notesSz cx="6858000" cy="9144000"/>
@@ -151,6 +153,8 @@
             <p14:sldId id="268"/>
             <p14:sldId id="262"/>
             <p14:sldId id="266"/>
+            <p14:sldId id="274"/>
+            <p14:sldId id="275"/>
             <p14:sldId id="272"/>
             <p14:sldId id="273"/>
           </p14:sldIdLst>
@@ -243,7 +247,7 @@
           <a:p>
             <a:fld id="{BFF60D3A-5D21-45DA-A75B-4001EFC2C930}" type="datetimeFigureOut">
               <a:rPr lang="en-US" smtClean="0"/>
-              <a:t>5/2/2020</a:t>
+              <a:t>5/5/2020</a:t>
             </a:fld>
             <a:endParaRPr lang="en-US"/>
           </a:p>
@@ -776,7 +780,7 @@
           <a:p>
             <a:fld id="{C43A90FF-8450-479C-9E7E-8F84BEB5A648}" type="datetime1">
               <a:rPr lang="en-US" smtClean="0"/>
-              <a:t>5/2/2020</a:t>
+              <a:t>5/5/2020</a:t>
             </a:fld>
             <a:endParaRPr lang="en-US"/>
           </a:p>
@@ -946,7 +950,7 @@
           <a:p>
             <a:fld id="{0081B4DA-931F-4488-A590-4D371548E4E2}" type="datetime1">
               <a:rPr lang="en-US" smtClean="0"/>
-              <a:t>5/2/2020</a:t>
+              <a:t>5/5/2020</a:t>
             </a:fld>
             <a:endParaRPr lang="en-US"/>
           </a:p>
@@ -1126,7 +1130,7 @@
           <a:p>
             <a:fld id="{8909A2ED-D3BC-433B-BEA5-A708FC100954}" type="datetime1">
               <a:rPr lang="en-US" smtClean="0"/>
-              <a:t>5/2/2020</a:t>
+              <a:t>5/5/2020</a:t>
             </a:fld>
             <a:endParaRPr lang="en-US"/>
           </a:p>
@@ -1330,7 +1334,7 @@
           <a:p>
             <a:fld id="{29614AEB-5230-4DD8-B8D4-126861929F36}" type="datetime1">
               <a:rPr lang="en-US" smtClean="0"/>
-              <a:t>5/2/2020</a:t>
+              <a:t>5/5/2020</a:t>
             </a:fld>
             <a:endParaRPr lang="en-US"/>
           </a:p>
@@ -1576,7 +1580,7 @@
           <a:p>
             <a:fld id="{7C890622-CFF6-4FB5-960E-93B71514DF10}" type="datetime1">
               <a:rPr lang="en-US" smtClean="0"/>
-              <a:t>5/2/2020</a:t>
+              <a:t>5/5/2020</a:t>
             </a:fld>
             <a:endParaRPr lang="en-US"/>
           </a:p>
@@ -1864,7 +1868,7 @@
           <a:p>
             <a:fld id="{0DFBE943-C392-448E-9D12-5874D86E4C3B}" type="datetime1">
               <a:rPr lang="en-US" smtClean="0"/>
-              <a:t>5/2/2020</a:t>
+              <a:t>5/5/2020</a:t>
             </a:fld>
             <a:endParaRPr lang="en-US"/>
           </a:p>
@@ -2286,7 +2290,7 @@
           <a:p>
             <a:fld id="{EE05CED9-DB5A-40D3-983E-B099662B6ED7}" type="datetime1">
               <a:rPr lang="en-US" smtClean="0"/>
-              <a:t>5/2/2020</a:t>
+              <a:t>5/5/2020</a:t>
             </a:fld>
             <a:endParaRPr lang="en-US"/>
           </a:p>
@@ -2404,7 +2408,7 @@
           <a:p>
             <a:fld id="{35F567BB-1D10-4A9C-A6CB-9CBE8D5A7747}" type="datetime1">
               <a:rPr lang="en-US" smtClean="0"/>
-              <a:t>5/2/2020</a:t>
+              <a:t>5/5/2020</a:t>
             </a:fld>
             <a:endParaRPr lang="en-US"/>
           </a:p>
@@ -2499,7 +2503,7 @@
           <a:p>
             <a:fld id="{260A569C-1675-4A88-8B3C-8B2221480241}" type="datetime1">
               <a:rPr lang="en-US" smtClean="0"/>
-              <a:t>5/2/2020</a:t>
+              <a:t>5/5/2020</a:t>
             </a:fld>
             <a:endParaRPr lang="en-US"/>
           </a:p>
@@ -2792,7 +2796,7 @@
           <a:p>
             <a:fld id="{E918CE2C-459C-4DE5-9A61-E7695E053BD6}" type="datetime1">
               <a:rPr lang="en-US" smtClean="0"/>
-              <a:t>5/2/2020</a:t>
+              <a:t>5/5/2020</a:t>
             </a:fld>
             <a:endParaRPr lang="en-US"/>
           </a:p>
@@ -3045,7 +3049,7 @@
           <a:p>
             <a:fld id="{239832CA-37D4-4706-9881-9B5F213F948E}" type="datetime1">
               <a:rPr lang="en-US" smtClean="0"/>
-              <a:t>5/2/2020</a:t>
+              <a:t>5/5/2020</a:t>
             </a:fld>
             <a:endParaRPr lang="en-US"/>
           </a:p>
@@ -3258,7 +3262,7 @@
           <a:p>
             <a:fld id="{08B2AC18-8556-44BF-B96F-AEAE4E13A1B3}" type="datetime1">
               <a:rPr lang="en-US" smtClean="0"/>
-              <a:t>5/2/2020</a:t>
+              <a:t>5/5/2020</a:t>
             </a:fld>
             <a:endParaRPr lang="en-US"/>
           </a:p>
@@ -3689,29 +3693,13 @@
             </a:r>
             <a:r>
               <a:rPr lang="es-AR" sz="3200" dirty="0" smtClean="0"/>
-              <a:t> </a:t>
-            </a:r>
-            <a:r>
-              <a:rPr lang="es-AR" sz="3200" dirty="0" smtClean="0"/>
-              <a:t>TD(</a:t>
+              <a:t> TD(</a:t>
             </a:r>
             <a:r>
               <a:rPr lang="es-AR" sz="3200" dirty="0" smtClean="0">
                 <a:sym typeface="Symbol"/>
               </a:rPr>
-              <a:t>) </a:t>
-            </a:r>
-            <a:r>
-              <a:rPr lang="es-AR" sz="3200" dirty="0" smtClean="0">
-                <a:sym typeface="Symbol"/>
-              </a:rPr>
-              <a:t>and </a:t>
-            </a:r>
-            <a:r>
-              <a:rPr lang="es-AR" sz="3200" dirty="0" smtClean="0">
-                <a:sym typeface="Symbol"/>
-              </a:rPr>
-              <a:t>Monte Carlo </a:t>
+              <a:t>) and Monte Carlo </a:t>
             </a:r>
             <a:r>
               <a:rPr lang="es-AR" sz="3200" dirty="0" err="1" smtClean="0">
@@ -3820,14 +3808,25 @@
         <p:spPr/>
         <p:txBody>
           <a:bodyPr anchor="ctr">
-            <a:normAutofit/>
+            <a:normAutofit fontScale="92500" lnSpcReduction="20000"/>
           </a:bodyPr>
           <a:lstStyle/>
           <a:p>
             <a:r>
               <a:rPr lang="en-US" sz="2400" dirty="0" smtClean="0"/>
-              <a:t>Thu, 30-Apr-2020</a:t>
-            </a:r>
+              <a:t>Thu, </a:t>
+            </a:r>
+            <a:r>
+              <a:rPr lang="en-US" sz="2400" dirty="0" smtClean="0"/>
+              <a:t>30-Apr-2020</a:t>
+            </a:r>
+          </a:p>
+          <a:p>
+            <a:r>
+              <a:rPr lang="en-US" sz="2400" i="1" dirty="0" smtClean="0"/>
+              <a:t>Updated: Mon, 04-May-2020</a:t>
+            </a:r>
+            <a:endParaRPr lang="en-US" sz="2400" i="1" dirty="0" smtClean="0"/>
           </a:p>
           <a:p>
             <a:r>
@@ -6349,8 +6348,12 @@
           <a:p>
             <a:pPr algn="ctr"/>
             <a:r>
+              <a:rPr lang="es-AR" dirty="0" err="1" smtClean="0"/>
+              <a:t>Every-visit</a:t>
+            </a:r>
+            <a:r>
               <a:rPr lang="es-AR" dirty="0" smtClean="0"/>
-              <a:t>MC</a:t>
+              <a:t> MC</a:t>
             </a:r>
             <a:r>
               <a:rPr lang="es-AR" dirty="0"/>
@@ -6584,11 +6587,7 @@
             </a:r>
             <a:r>
               <a:rPr lang="es-AR" dirty="0" smtClean="0"/>
-              <a:t> </a:t>
-            </a:r>
-            <a:r>
-              <a:rPr lang="es-AR" dirty="0" smtClean="0"/>
-              <a:t>0.5 (~ 20% </a:t>
+              <a:t> 0.5 (~ 20% </a:t>
             </a:r>
             <a:r>
               <a:rPr lang="es-AR" dirty="0" err="1" smtClean="0"/>
@@ -6604,9 +6603,6 @@
               </a:rPr>
               <a:t>.</a:t>
             </a:r>
-            <a:endParaRPr lang="es-AR" dirty="0" smtClean="0">
-              <a:sym typeface="Symbol"/>
-            </a:endParaRPr>
           </a:p>
           <a:p>
             <a:pPr marL="342900" indent="-342900">
@@ -7465,8 +7461,12 @@
           <a:p>
             <a:pPr algn="ctr"/>
             <a:r>
+              <a:rPr lang="es-AR" dirty="0" err="1" smtClean="0"/>
+              <a:t>Every-visit</a:t>
+            </a:r>
+            <a:r>
               <a:rPr lang="es-AR" dirty="0" smtClean="0"/>
-              <a:t>MC</a:t>
+              <a:t> MC</a:t>
             </a:r>
             <a:r>
               <a:rPr lang="es-AR" dirty="0"/>
@@ -8494,8 +8494,12 @@
           <a:p>
             <a:pPr algn="ctr"/>
             <a:r>
+              <a:rPr lang="es-AR" dirty="0" err="1" smtClean="0"/>
+              <a:t>Every-visit</a:t>
+            </a:r>
+            <a:r>
               <a:rPr lang="es-AR" dirty="0" smtClean="0"/>
-              <a:t>MC</a:t>
+              <a:t> MC</a:t>
             </a:r>
             <a:r>
               <a:rPr lang="es-AR" dirty="0"/>
@@ -9669,8 +9673,12 @@
           <a:p>
             <a:pPr algn="ctr"/>
             <a:r>
+              <a:rPr lang="es-AR" dirty="0" err="1" smtClean="0"/>
+              <a:t>Every-visit</a:t>
+            </a:r>
+            <a:r>
               <a:rPr lang="es-AR" dirty="0" smtClean="0"/>
-              <a:t>MC</a:t>
+              <a:t> MC</a:t>
             </a:r>
             <a:r>
               <a:rPr lang="es-AR" dirty="0"/>
@@ -10737,6 +10745,2112 @@
 </file>
 
 <file path=ppt/slides/slide16.xml><?xml version="1.0" encoding="utf-8"?>
+<p:sld xmlns:a="http://schemas.openxmlformats.org/drawingml/2006/main" xmlns:r="http://schemas.openxmlformats.org/officeDocument/2006/relationships" xmlns:p="http://schemas.openxmlformats.org/presentationml/2006/main">
+  <p:cSld>
+    <p:spTree>
+      <p:nvGrpSpPr>
+        <p:cNvPr id="1" name=""/>
+        <p:cNvGrpSpPr/>
+        <p:nvPr/>
+      </p:nvGrpSpPr>
+      <p:grpSpPr>
+        <a:xfrm>
+          <a:off x="0" y="0"/>
+          <a:ext cx="0" cy="0"/>
+          <a:chOff x="0" y="0"/>
+          <a:chExt cx="0" cy="0"/>
+        </a:xfrm>
+      </p:grpSpPr>
+      <p:pic>
+        <p:nvPicPr>
+          <p:cNvPr id="1028" name="Picture 4" descr="E:\Daniel\Projects\PhD-RL-Toulouse\projects\RL-001-MemoryManagement\results\SimulateTDLambda-Gridworld1D-v0.8-mc-ValueFunctionEstimation-adjbyepi=False,amin=0.001-Epi1000-Exp1.png"/>
+          <p:cNvPicPr>
+            <a:picLocks noChangeArrowheads="1"/>
+          </p:cNvPicPr>
+          <p:nvPr/>
+        </p:nvPicPr>
+        <p:blipFill>
+          <a:blip r:embed="rId2">
+            <a:extLst>
+              <a:ext uri="{28A0092B-C50C-407E-A947-70E740481C1C}">
+                <a14:useLocalDpi xmlns:a14="http://schemas.microsoft.com/office/drawing/2010/main" val="0"/>
+              </a:ext>
+            </a:extLst>
+          </a:blip>
+          <a:srcRect/>
+          <a:stretch>
+            <a:fillRect/>
+          </a:stretch>
+        </p:blipFill>
+        <p:spPr bwMode="auto">
+          <a:xfrm>
+            <a:off x="5638400" y="4221088"/>
+            <a:ext cx="3096000" cy="2556000"/>
+          </a:xfrm>
+          <a:prstGeom prst="rect">
+            <a:avLst/>
+          </a:prstGeom>
+          <a:noFill/>
+          <a:extLst>
+            <a:ext uri="{909E8E84-426E-40DD-AFC4-6F175D3DCCD1}">
+              <a14:hiddenFill xmlns:a14="http://schemas.microsoft.com/office/drawing/2010/main">
+                <a:solidFill>
+                  <a:srgbClr val="FFFFFF"/>
+                </a:solidFill>
+              </a14:hiddenFill>
+            </a:ext>
+          </a:extLst>
+        </p:spPr>
+      </p:pic>
+      <p:pic>
+        <p:nvPicPr>
+          <p:cNvPr id="1027" name="Picture 3" descr="E:\Daniel\Projects\PhD-RL-Toulouse\projects\RL-001-MemoryManagement\results\SimulateTDLambda-Gridworld1D-v0.8-mc-adjbyepi=False,amin=0-Epi5000-Exp5.png"/>
+          <p:cNvPicPr>
+            <a:picLocks noChangeArrowheads="1"/>
+          </p:cNvPicPr>
+          <p:nvPr/>
+        </p:nvPicPr>
+        <p:blipFill rotWithShape="1">
+          <a:blip r:embed="rId3">
+            <a:extLst>
+              <a:ext uri="{28A0092B-C50C-407E-A947-70E740481C1C}">
+                <a14:useLocalDpi xmlns:a14="http://schemas.microsoft.com/office/drawing/2010/main" val="0"/>
+              </a:ext>
+            </a:extLst>
+          </a:blip>
+          <a:srcRect l="9375" t="8438" r="49219" b="7188"/>
+          <a:stretch/>
+        </p:blipFill>
+        <p:spPr bwMode="auto">
+          <a:xfrm>
+            <a:off x="3024128" y="4365104"/>
+            <a:ext cx="2700000" cy="2310792"/>
+          </a:xfrm>
+          <a:prstGeom prst="rect">
+            <a:avLst/>
+          </a:prstGeom>
+          <a:noFill/>
+          <a:extLst>
+            <a:ext uri="{909E8E84-426E-40DD-AFC4-6F175D3DCCD1}">
+              <a14:hiddenFill xmlns:a14="http://schemas.microsoft.com/office/drawing/2010/main">
+                <a:solidFill>
+                  <a:srgbClr val="FFFFFF"/>
+                </a:solidFill>
+              </a14:hiddenFill>
+            </a:ext>
+          </a:extLst>
+        </p:spPr>
+      </p:pic>
+      <p:pic>
+        <p:nvPicPr>
+          <p:cNvPr id="1026" name="Picture 2" descr="E:\Daniel\Projects\PhD-RL-Toulouse\projects\RL-001-MemoryManagement\results\SimulateTDLambda-Gridworld1D-v0.8-mc-adjbyepi=False,amin=0-Epi1000-Exp5.png"/>
+          <p:cNvPicPr>
+            <a:picLocks noChangeAspect="1" noChangeArrowheads="1"/>
+          </p:cNvPicPr>
+          <p:nvPr/>
+        </p:nvPicPr>
+        <p:blipFill>
+          <a:blip r:embed="rId4">
+            <a:extLst>
+              <a:ext uri="{28A0092B-C50C-407E-A947-70E740481C1C}">
+                <a14:useLocalDpi xmlns:a14="http://schemas.microsoft.com/office/drawing/2010/main" val="0"/>
+              </a:ext>
+            </a:extLst>
+          </a:blip>
+          <a:srcRect/>
+          <a:stretch>
+            <a:fillRect/>
+          </a:stretch>
+        </p:blipFill>
+        <p:spPr bwMode="auto">
+          <a:xfrm>
+            <a:off x="2268000" y="729080"/>
+            <a:ext cx="6840000" cy="3420000"/>
+          </a:xfrm>
+          <a:prstGeom prst="rect">
+            <a:avLst/>
+          </a:prstGeom>
+          <a:noFill/>
+          <a:extLst>
+            <a:ext uri="{909E8E84-426E-40DD-AFC4-6F175D3DCCD1}">
+              <a14:hiddenFill xmlns:a14="http://schemas.microsoft.com/office/drawing/2010/main">
+                <a:solidFill>
+                  <a:srgbClr val="FFFFFF"/>
+                </a:solidFill>
+              </a14:hiddenFill>
+            </a:ext>
+          </a:extLst>
+        </p:spPr>
+      </p:pic>
+      <p:sp>
+        <p:nvSpPr>
+          <p:cNvPr id="2" name="Title 1"/>
+          <p:cNvSpPr>
+            <a:spLocks noGrp="1"/>
+          </p:cNvSpPr>
+          <p:nvPr>
+            <p:ph type="title"/>
+          </p:nvPr>
+        </p:nvSpPr>
+        <p:spPr>
+          <a:solidFill>
+            <a:schemeClr val="accent5">
+              <a:lumMod val="20000"/>
+              <a:lumOff val="80000"/>
+            </a:schemeClr>
+          </a:solidFill>
+          <a:ln>
+            <a:solidFill>
+              <a:schemeClr val="tx1"/>
+            </a:solidFill>
+          </a:ln>
+        </p:spPr>
+        <p:txBody>
+          <a:bodyPr anchor="ctr">
+            <a:normAutofit fontScale="90000"/>
+          </a:bodyPr>
+          <a:lstStyle/>
+          <a:p>
+            <a:pPr algn="ctr"/>
+            <a:r>
+              <a:rPr lang="es-AR" dirty="0" err="1" smtClean="0"/>
+              <a:t>First-visit</a:t>
+            </a:r>
+            <a:r>
+              <a:rPr lang="es-AR" dirty="0" smtClean="0"/>
+              <a:t> MC</a:t>
+            </a:r>
+            <a:r>
+              <a:rPr lang="es-AR" dirty="0"/>
+              <a:t/>
+            </a:r>
+            <a:br>
+              <a:rPr lang="es-AR" dirty="0"/>
+            </a:br>
+            <a:r>
+              <a:rPr lang="es-AR" b="0" dirty="0" err="1" smtClean="0">
+                <a:sym typeface="Symbol"/>
+              </a:rPr>
+              <a:t>learning</a:t>
+            </a:r>
+            <a:r>
+              <a:rPr lang="es-AR" b="0" dirty="0" smtClean="0">
+                <a:sym typeface="Symbol"/>
+              </a:rPr>
+              <a:t> </a:t>
+            </a:r>
+            <a:r>
+              <a:rPr lang="es-AR" b="0" dirty="0" err="1" smtClean="0">
+                <a:sym typeface="Symbol"/>
+              </a:rPr>
+              <a:t>rate</a:t>
+            </a:r>
+            <a:r>
+              <a:rPr lang="es-AR" b="0" dirty="0" smtClean="0">
+                <a:sym typeface="Symbol"/>
+              </a:rPr>
+              <a:t> </a:t>
+            </a:r>
+            <a:r>
+              <a:rPr lang="es-AR" b="0" dirty="0" err="1" smtClean="0">
+                <a:sym typeface="Symbol"/>
+              </a:rPr>
+              <a:t>adjusted</a:t>
+            </a:r>
+            <a:r>
+              <a:rPr lang="es-AR" b="0" dirty="0" smtClean="0">
+                <a:sym typeface="Symbol"/>
+              </a:rPr>
+              <a:t> </a:t>
+            </a:r>
+            <a:r>
+              <a:rPr lang="es-AR" b="0" dirty="0" err="1" smtClean="0">
+                <a:sym typeface="Symbol"/>
+              </a:rPr>
+              <a:t>by</a:t>
+            </a:r>
+            <a:r>
+              <a:rPr lang="es-AR" b="0" dirty="0" smtClean="0">
+                <a:sym typeface="Symbol"/>
+              </a:rPr>
+              <a:t> </a:t>
+            </a:r>
+            <a:r>
+              <a:rPr lang="es-AR" b="0" dirty="0" err="1" smtClean="0">
+                <a:sym typeface="Symbol"/>
+              </a:rPr>
+              <a:t>state</a:t>
+            </a:r>
+            <a:r>
+              <a:rPr lang="es-AR" b="0" dirty="0" smtClean="0">
+                <a:sym typeface="Symbol"/>
+              </a:rPr>
+              <a:t> </a:t>
+            </a:r>
+            <a:r>
+              <a:rPr lang="es-AR" b="0" dirty="0" err="1" smtClean="0">
+                <a:sym typeface="Symbol"/>
+              </a:rPr>
+              <a:t>occupation</a:t>
+            </a:r>
+            <a:r>
+              <a:rPr lang="es-AR" b="0" dirty="0" smtClean="0">
+                <a:sym typeface="Symbol"/>
+              </a:rPr>
+              <a:t> </a:t>
+            </a:r>
+            <a:r>
+              <a:rPr lang="es-AR" b="0" dirty="0" err="1" smtClean="0">
+                <a:sym typeface="Symbol"/>
+              </a:rPr>
+              <a:t>count</a:t>
+            </a:r>
+            <a:endParaRPr lang="en-US" b="0" dirty="0"/>
+          </a:p>
+        </p:txBody>
+      </p:sp>
+      <p:sp>
+        <p:nvSpPr>
+          <p:cNvPr id="4" name="Text Placeholder 3"/>
+          <p:cNvSpPr>
+            <a:spLocks noGrp="1"/>
+          </p:cNvSpPr>
+          <p:nvPr>
+            <p:ph type="body" sz="half" idx="2"/>
+          </p:nvPr>
+        </p:nvSpPr>
+        <p:spPr/>
+        <p:txBody>
+          <a:bodyPr>
+            <a:normAutofit/>
+          </a:bodyPr>
+          <a:lstStyle/>
+          <a:p>
+            <a:pPr algn="ctr"/>
+            <a:r>
+              <a:rPr lang="es-AR" dirty="0" smtClean="0">
+                <a:sym typeface="Symbol"/>
+              </a:rPr>
+              <a:t></a:t>
+            </a:r>
+            <a:r>
+              <a:rPr lang="es-AR" baseline="-25000" dirty="0" smtClean="0">
+                <a:sym typeface="Symbol"/>
+              </a:rPr>
+              <a:t>0</a:t>
+            </a:r>
+            <a:r>
+              <a:rPr lang="es-AR" dirty="0" smtClean="0">
+                <a:sym typeface="Symbol"/>
+              </a:rPr>
+              <a:t> = 0.1</a:t>
+            </a:r>
+            <a:endParaRPr lang="es-AR" dirty="0" smtClean="0"/>
+          </a:p>
+          <a:p>
+            <a:pPr algn="ctr"/>
+            <a:r>
+              <a:rPr lang="es-AR" dirty="0" smtClean="0">
+                <a:sym typeface="Symbol"/>
+              </a:rPr>
+              <a:t></a:t>
+            </a:r>
+            <a:r>
+              <a:rPr lang="es-AR" baseline="-25000" dirty="0" smtClean="0">
+                <a:sym typeface="Symbol"/>
+              </a:rPr>
+              <a:t>min</a:t>
+            </a:r>
+            <a:r>
+              <a:rPr lang="es-AR" dirty="0" smtClean="0">
+                <a:sym typeface="Symbol"/>
+              </a:rPr>
+              <a:t> = 0</a:t>
+            </a:r>
+          </a:p>
+          <a:p>
+            <a:endParaRPr lang="es-AR" dirty="0" smtClean="0">
+              <a:sym typeface="Symbol"/>
+            </a:endParaRPr>
+          </a:p>
+          <a:p>
+            <a:r>
+              <a:rPr lang="es-AR" b="1" dirty="0" smtClean="0">
+                <a:sym typeface="Symbol"/>
+              </a:rPr>
+              <a:t>OBSERVATIONS:</a:t>
+            </a:r>
+          </a:p>
+          <a:p>
+            <a:pPr marL="342900" indent="-342900">
+              <a:buFont typeface="+mj-lt"/>
+              <a:buAutoNum type="arabicPeriod"/>
+            </a:pPr>
+            <a:r>
+              <a:rPr lang="es-AR" dirty="0" err="1" smtClean="0"/>
+              <a:t>The</a:t>
+            </a:r>
+            <a:r>
+              <a:rPr lang="es-AR" dirty="0" smtClean="0"/>
+              <a:t> </a:t>
+            </a:r>
+            <a:r>
+              <a:rPr lang="es-AR" dirty="0" err="1" smtClean="0"/>
+              <a:t>first-visit</a:t>
+            </a:r>
+            <a:r>
+              <a:rPr lang="es-AR" dirty="0" smtClean="0"/>
+              <a:t> MC </a:t>
+            </a:r>
+            <a:r>
+              <a:rPr lang="es-AR" dirty="0" err="1" smtClean="0"/>
+              <a:t>is</a:t>
+            </a:r>
+            <a:r>
+              <a:rPr lang="es-AR" dirty="0" smtClean="0"/>
+              <a:t> </a:t>
+            </a:r>
+            <a:r>
+              <a:rPr lang="es-AR" b="1" dirty="0" smtClean="0"/>
+              <a:t>similar to </a:t>
+            </a:r>
+            <a:r>
+              <a:rPr lang="es-AR" b="1" dirty="0" err="1" smtClean="0"/>
+              <a:t>the</a:t>
+            </a:r>
+            <a:r>
+              <a:rPr lang="es-AR" b="1" dirty="0" smtClean="0"/>
+              <a:t> </a:t>
+            </a:r>
+            <a:r>
+              <a:rPr lang="es-AR" b="1" dirty="0" err="1" smtClean="0"/>
+              <a:t>every-visit</a:t>
+            </a:r>
+            <a:r>
+              <a:rPr lang="es-AR" b="1" dirty="0" smtClean="0"/>
+              <a:t> MC </a:t>
+            </a:r>
+            <a:r>
+              <a:rPr lang="es-AR" dirty="0" err="1" smtClean="0"/>
+              <a:t>with</a:t>
+            </a:r>
+            <a:r>
+              <a:rPr lang="es-AR" dirty="0" smtClean="0"/>
+              <a:t> </a:t>
+            </a:r>
+            <a:r>
+              <a:rPr lang="es-AR" dirty="0" err="1" smtClean="0"/>
+              <a:t>learning</a:t>
+            </a:r>
+            <a:r>
+              <a:rPr lang="es-AR" dirty="0" smtClean="0"/>
+              <a:t> </a:t>
+            </a:r>
+            <a:r>
+              <a:rPr lang="es-AR" dirty="0" err="1" smtClean="0"/>
+              <a:t>rate</a:t>
+            </a:r>
+            <a:r>
+              <a:rPr lang="es-AR" dirty="0" smtClean="0"/>
+              <a:t> </a:t>
+            </a:r>
+            <a:r>
+              <a:rPr lang="es-AR" dirty="0" err="1" smtClean="0"/>
+              <a:t>adjusted</a:t>
+            </a:r>
+            <a:r>
+              <a:rPr lang="es-AR" dirty="0" smtClean="0"/>
+              <a:t> </a:t>
+            </a:r>
+            <a:r>
+              <a:rPr lang="es-AR" dirty="0" err="1" smtClean="0"/>
+              <a:t>by</a:t>
+            </a:r>
+            <a:r>
+              <a:rPr lang="es-AR" dirty="0" smtClean="0"/>
+              <a:t> </a:t>
+            </a:r>
+            <a:r>
+              <a:rPr lang="es-AR" dirty="0" err="1" smtClean="0"/>
+              <a:t>episode</a:t>
+            </a:r>
+            <a:r>
+              <a:rPr lang="es-AR" dirty="0" smtClean="0"/>
+              <a:t> </a:t>
+            </a:r>
+            <a:r>
+              <a:rPr lang="es-AR" dirty="0" err="1" smtClean="0"/>
+              <a:t>but</a:t>
+            </a:r>
+            <a:r>
+              <a:rPr lang="es-AR" dirty="0" smtClean="0"/>
+              <a:t> </a:t>
+            </a:r>
+            <a:r>
+              <a:rPr lang="es-AR" b="1" dirty="0" err="1" smtClean="0"/>
+              <a:t>faster</a:t>
+            </a:r>
+            <a:r>
+              <a:rPr lang="es-AR" b="1" dirty="0" smtClean="0"/>
+              <a:t> to converge in </a:t>
+            </a:r>
+            <a:r>
+              <a:rPr lang="es-AR" b="1" dirty="0" err="1" smtClean="0"/>
+              <a:t>the</a:t>
+            </a:r>
+            <a:r>
+              <a:rPr lang="es-AR" b="1" dirty="0" smtClean="0"/>
+              <a:t> short </a:t>
+            </a:r>
+            <a:r>
+              <a:rPr lang="es-AR" b="1" dirty="0" err="1" smtClean="0"/>
+              <a:t>term</a:t>
+            </a:r>
+            <a:r>
+              <a:rPr lang="es-AR" dirty="0" smtClean="0">
+                <a:sym typeface="Symbol"/>
+              </a:rPr>
+              <a:t>.</a:t>
+            </a:r>
+          </a:p>
+          <a:p>
+            <a:pPr marL="342900" indent="-342900">
+              <a:buFont typeface="+mj-lt"/>
+              <a:buAutoNum type="arabicPeriod"/>
+            </a:pPr>
+            <a:endParaRPr lang="es-AR" dirty="0" smtClean="0">
+              <a:sym typeface="Symbol"/>
+            </a:endParaRPr>
+          </a:p>
+          <a:p>
+            <a:pPr marL="342900" indent="-342900">
+              <a:buFont typeface="+mj-lt"/>
+              <a:buAutoNum type="arabicPeriod"/>
+            </a:pPr>
+            <a:r>
+              <a:rPr lang="es-AR" dirty="0" err="1" smtClean="0">
+                <a:sym typeface="Symbol"/>
+              </a:rPr>
+              <a:t>The</a:t>
+            </a:r>
+            <a:r>
+              <a:rPr lang="es-AR" dirty="0" smtClean="0">
+                <a:sym typeface="Symbol"/>
+              </a:rPr>
+              <a:t> </a:t>
+            </a:r>
+            <a:r>
+              <a:rPr lang="es-AR" b="1" dirty="0" err="1" smtClean="0">
+                <a:sym typeface="Symbol"/>
+              </a:rPr>
+              <a:t>convergence</a:t>
+            </a:r>
+            <a:r>
+              <a:rPr lang="es-AR" b="1" dirty="0" smtClean="0">
+                <a:sym typeface="Symbol"/>
+              </a:rPr>
+              <a:t> </a:t>
+            </a:r>
+            <a:r>
+              <a:rPr lang="es-AR" b="1" dirty="0" err="1" smtClean="0">
+                <a:sym typeface="Symbol"/>
+              </a:rPr>
+              <a:t>rate</a:t>
+            </a:r>
+            <a:r>
+              <a:rPr lang="es-AR" b="1" dirty="0" smtClean="0">
+                <a:sym typeface="Symbol"/>
+              </a:rPr>
+              <a:t> </a:t>
+            </a:r>
+            <a:r>
+              <a:rPr lang="es-AR" dirty="0" err="1" smtClean="0">
+                <a:sym typeface="Symbol"/>
+              </a:rPr>
+              <a:t>is</a:t>
+            </a:r>
+            <a:r>
+              <a:rPr lang="es-AR" dirty="0" smtClean="0">
+                <a:sym typeface="Symbol"/>
+              </a:rPr>
+              <a:t> ~ T</a:t>
+            </a:r>
+            <a:r>
+              <a:rPr lang="es-AR" baseline="30000" dirty="0" smtClean="0">
+                <a:sym typeface="Symbol"/>
+              </a:rPr>
+              <a:t>-1/4</a:t>
+            </a:r>
+            <a:r>
+              <a:rPr lang="es-AR" dirty="0" smtClean="0">
+                <a:sym typeface="Symbol"/>
+              </a:rPr>
+              <a:t>.</a:t>
+            </a:r>
+          </a:p>
+          <a:p>
+            <a:pPr marL="342900" indent="-342900">
+              <a:buFont typeface="+mj-lt"/>
+              <a:buAutoNum type="arabicPeriod"/>
+            </a:pPr>
+            <a:endParaRPr lang="es-AR" dirty="0">
+              <a:sym typeface="Symbol"/>
+            </a:endParaRPr>
+          </a:p>
+          <a:p>
+            <a:pPr marL="342900" indent="-342900">
+              <a:buFont typeface="+mj-lt"/>
+              <a:buAutoNum type="arabicPeriod"/>
+            </a:pPr>
+            <a:r>
+              <a:rPr lang="es-AR" dirty="0" err="1">
+                <a:sym typeface="Symbol"/>
+              </a:rPr>
+              <a:t>The</a:t>
+            </a:r>
+            <a:r>
+              <a:rPr lang="es-AR" dirty="0">
+                <a:sym typeface="Symbol"/>
+              </a:rPr>
+              <a:t> </a:t>
+            </a:r>
+            <a:r>
+              <a:rPr lang="es-AR" dirty="0" err="1">
+                <a:sym typeface="Symbol"/>
+              </a:rPr>
+              <a:t>estimated</a:t>
+            </a:r>
+            <a:r>
+              <a:rPr lang="es-AR" dirty="0">
+                <a:sym typeface="Symbol"/>
+              </a:rPr>
+              <a:t> </a:t>
+            </a:r>
+            <a:r>
+              <a:rPr lang="es-AR" dirty="0" err="1">
+                <a:sym typeface="Symbol"/>
+              </a:rPr>
+              <a:t>state</a:t>
+            </a:r>
+            <a:r>
+              <a:rPr lang="es-AR" dirty="0">
+                <a:sym typeface="Symbol"/>
+              </a:rPr>
+              <a:t> </a:t>
+            </a:r>
+            <a:r>
+              <a:rPr lang="es-AR" dirty="0" err="1">
+                <a:sym typeface="Symbol"/>
+              </a:rPr>
+              <a:t>value</a:t>
+            </a:r>
+            <a:r>
+              <a:rPr lang="es-AR" dirty="0">
+                <a:sym typeface="Symbol"/>
+              </a:rPr>
+              <a:t> </a:t>
+            </a:r>
+            <a:r>
+              <a:rPr lang="es-AR" dirty="0" err="1">
+                <a:sym typeface="Symbol"/>
+              </a:rPr>
+              <a:t>function</a:t>
+            </a:r>
+            <a:r>
+              <a:rPr lang="es-AR" dirty="0">
+                <a:sym typeface="Symbol"/>
+              </a:rPr>
+              <a:t> </a:t>
+            </a:r>
+            <a:r>
+              <a:rPr lang="es-AR" dirty="0" err="1">
+                <a:sym typeface="Symbol"/>
+              </a:rPr>
+              <a:t>is</a:t>
+            </a:r>
+            <a:r>
+              <a:rPr lang="es-AR" dirty="0">
+                <a:sym typeface="Symbol"/>
+              </a:rPr>
+              <a:t> </a:t>
+            </a:r>
+            <a:r>
+              <a:rPr lang="es-AR" b="1" dirty="0" err="1" smtClean="0">
+                <a:solidFill>
+                  <a:srgbClr val="00B050"/>
+                </a:solidFill>
+                <a:sym typeface="Symbol"/>
+              </a:rPr>
+              <a:t>accetable</a:t>
+            </a:r>
+            <a:r>
+              <a:rPr lang="es-AR" dirty="0" smtClean="0">
+                <a:sym typeface="Symbol"/>
+              </a:rPr>
+              <a:t>.</a:t>
+            </a:r>
+            <a:endParaRPr lang="en-US" dirty="0"/>
+          </a:p>
+        </p:txBody>
+      </p:sp>
+      <p:sp>
+        <p:nvSpPr>
+          <p:cNvPr id="5" name="Slide Number Placeholder 4"/>
+          <p:cNvSpPr>
+            <a:spLocks noGrp="1"/>
+          </p:cNvSpPr>
+          <p:nvPr>
+            <p:ph type="sldNum" sz="quarter" idx="12"/>
+          </p:nvPr>
+        </p:nvSpPr>
+        <p:spPr/>
+        <p:txBody>
+          <a:bodyPr/>
+          <a:lstStyle/>
+          <a:p>
+            <a:fld id="{75E05CB0-B7BE-45F8-B32B-236A56ACDA27}" type="slidenum">
+              <a:rPr lang="en-US" smtClean="0"/>
+              <a:t>16</a:t>
+            </a:fld>
+            <a:endParaRPr lang="en-US" dirty="0"/>
+          </a:p>
+        </p:txBody>
+      </p:sp>
+      <p:sp>
+        <p:nvSpPr>
+          <p:cNvPr id="3" name="Content Placeholder 2"/>
+          <p:cNvSpPr>
+            <a:spLocks noGrp="1"/>
+          </p:cNvSpPr>
+          <p:nvPr>
+            <p:ph idx="1"/>
+          </p:nvPr>
+        </p:nvSpPr>
+        <p:spPr/>
+        <p:txBody>
+          <a:bodyPr>
+            <a:noAutofit/>
+          </a:bodyPr>
+          <a:lstStyle/>
+          <a:p>
+            <a:r>
+              <a:rPr lang="es-AR" sz="1200" dirty="0">
+                <a:hlinkClick r:id="rId5" action="ppaction://hlinksldjump"/>
+              </a:rPr>
+              <a:t>Back to </a:t>
+            </a:r>
+            <a:r>
+              <a:rPr lang="es-AR" sz="1200" dirty="0" err="1">
+                <a:hlinkClick r:id="rId5" action="ppaction://hlinksldjump"/>
+              </a:rPr>
+              <a:t>conclusions</a:t>
+            </a:r>
+            <a:r>
+              <a:rPr lang="es-AR" sz="1200" dirty="0">
+                <a:hlinkClick r:id="rId5" action="ppaction://hlinksldjump"/>
+              </a:rPr>
+              <a:t> (1)</a:t>
+            </a:r>
+            <a:r>
+              <a:rPr lang="es-AR" sz="1400" dirty="0" smtClean="0">
+                <a:hlinkClick r:id="rId6" action="ppaction://hlinksldjump"/>
+              </a:rPr>
+              <a:t/>
+            </a:r>
+            <a:br>
+              <a:rPr lang="es-AR" sz="1400" dirty="0" smtClean="0">
+                <a:hlinkClick r:id="rId6" action="ppaction://hlinksldjump"/>
+              </a:rPr>
+            </a:br>
+            <a:r>
+              <a:rPr lang="es-AR" sz="1200" dirty="0" smtClean="0">
+                <a:hlinkClick r:id="rId6" action="ppaction://hlinksldjump"/>
+              </a:rPr>
+              <a:t>Back </a:t>
+            </a:r>
+            <a:r>
+              <a:rPr lang="es-AR" sz="1200" dirty="0">
+                <a:hlinkClick r:id="rId6" action="ppaction://hlinksldjump"/>
+              </a:rPr>
+              <a:t>to </a:t>
+            </a:r>
+            <a:r>
+              <a:rPr lang="es-AR" sz="1200" dirty="0" err="1">
+                <a:hlinkClick r:id="rId6" action="ppaction://hlinksldjump"/>
+              </a:rPr>
+              <a:t>conclusions</a:t>
+            </a:r>
+            <a:r>
+              <a:rPr lang="es-AR" sz="1200" dirty="0">
+                <a:hlinkClick r:id="rId6" action="ppaction://hlinksldjump"/>
+              </a:rPr>
+              <a:t> (2</a:t>
+            </a:r>
+            <a:r>
+              <a:rPr lang="es-AR" sz="1200" dirty="0" smtClean="0">
+                <a:hlinkClick r:id="rId6" action="ppaction://hlinksldjump"/>
+              </a:rPr>
+              <a:t>)</a:t>
+            </a:r>
+            <a:r>
+              <a:rPr lang="es-AR" sz="1800" dirty="0"/>
+              <a:t>		</a:t>
+            </a:r>
+            <a:r>
+              <a:rPr lang="es-AR" sz="1800" dirty="0" err="1"/>
+              <a:t>After</a:t>
+            </a:r>
+            <a:r>
+              <a:rPr lang="es-AR" sz="1800" dirty="0"/>
+              <a:t> 1000 </a:t>
+            </a:r>
+            <a:r>
+              <a:rPr lang="es-AR" sz="1800" dirty="0" err="1"/>
+              <a:t>episodes</a:t>
+            </a:r>
+            <a:r>
+              <a:rPr lang="es-AR" sz="1800" dirty="0"/>
+              <a:t>…</a:t>
+            </a:r>
+          </a:p>
+          <a:p>
+            <a:r>
+              <a:rPr lang="es-AR" sz="1200" dirty="0">
+                <a:hlinkClick r:id="rId7" action="ppaction://hlinksldjump"/>
+              </a:rPr>
+              <a:t>Back to </a:t>
+            </a:r>
+            <a:r>
+              <a:rPr lang="es-AR" sz="1200" dirty="0" err="1">
+                <a:hlinkClick r:id="rId7" action="ppaction://hlinksldjump"/>
+              </a:rPr>
+              <a:t>conclusions</a:t>
+            </a:r>
+            <a:r>
+              <a:rPr lang="es-AR" sz="1200" dirty="0">
+                <a:hlinkClick r:id="rId7" action="ppaction://hlinksldjump"/>
+              </a:rPr>
+              <a:t> (3)</a:t>
+            </a:r>
+            <a:endParaRPr lang="es-AR" sz="1400" dirty="0"/>
+          </a:p>
+          <a:p>
+            <a:pPr algn="ctr"/>
+            <a:endParaRPr lang="es-AR" sz="1800" dirty="0" smtClean="0"/>
+          </a:p>
+          <a:p>
+            <a:pPr algn="ctr"/>
+            <a:endParaRPr lang="es-AR" sz="1800" dirty="0"/>
+          </a:p>
+          <a:p>
+            <a:pPr algn="ctr"/>
+            <a:endParaRPr lang="es-AR" sz="1800" dirty="0" smtClean="0"/>
+          </a:p>
+          <a:p>
+            <a:pPr algn="ctr"/>
+            <a:endParaRPr lang="es-AR" sz="1800" dirty="0"/>
+          </a:p>
+          <a:p>
+            <a:pPr algn="ctr"/>
+            <a:endParaRPr lang="es-AR" sz="1800" dirty="0" smtClean="0"/>
+          </a:p>
+          <a:p>
+            <a:pPr algn="ctr"/>
+            <a:endParaRPr lang="es-AR" sz="1800" dirty="0"/>
+          </a:p>
+          <a:p>
+            <a:pPr algn="ctr"/>
+            <a:endParaRPr lang="es-AR" sz="1800" dirty="0" smtClean="0"/>
+          </a:p>
+          <a:p>
+            <a:pPr algn="ctr"/>
+            <a:endParaRPr lang="es-AR" sz="1800" dirty="0"/>
+          </a:p>
+          <a:p>
+            <a:pPr algn="ctr"/>
+            <a:endParaRPr lang="es-AR" sz="1800" dirty="0" smtClean="0"/>
+          </a:p>
+          <a:p>
+            <a:r>
+              <a:rPr lang="es-AR" sz="1400" b="1" dirty="0" smtClean="0">
+                <a:solidFill>
+                  <a:schemeClr val="accent1"/>
+                </a:solidFill>
+              </a:rPr>
+              <a:t>	</a:t>
+            </a:r>
+            <a:r>
+              <a:rPr lang="es-AR" sz="1400" b="1" dirty="0" err="1" smtClean="0">
+                <a:solidFill>
+                  <a:schemeClr val="accent1"/>
+                </a:solidFill>
+              </a:rPr>
+              <a:t>After</a:t>
+            </a:r>
+            <a:r>
+              <a:rPr lang="es-AR" sz="1400" b="1" dirty="0" smtClean="0">
+                <a:solidFill>
+                  <a:schemeClr val="accent1"/>
+                </a:solidFill>
+              </a:rPr>
+              <a:t> </a:t>
+            </a:r>
+            <a:r>
+              <a:rPr lang="es-AR" sz="1400" b="1" dirty="0">
+                <a:solidFill>
+                  <a:schemeClr val="accent1"/>
+                </a:solidFill>
+              </a:rPr>
+              <a:t>5000 </a:t>
+            </a:r>
+            <a:r>
+              <a:rPr lang="es-AR" sz="1400" b="1" dirty="0" err="1" smtClean="0">
+                <a:solidFill>
+                  <a:schemeClr val="accent1"/>
+                </a:solidFill>
+              </a:rPr>
+              <a:t>episodes</a:t>
+            </a:r>
+            <a:r>
+              <a:rPr lang="es-AR" sz="1400" b="1" dirty="0" smtClean="0">
+                <a:solidFill>
+                  <a:schemeClr val="accent1"/>
+                </a:solidFill>
+              </a:rPr>
+              <a:t>…</a:t>
+            </a:r>
+            <a:r>
+              <a:rPr lang="es-AR" sz="1400" dirty="0"/>
+              <a:t>	  </a:t>
+            </a:r>
+            <a:r>
+              <a:rPr lang="es-AR" sz="1400" dirty="0" smtClean="0"/>
+              <a:t>	         </a:t>
+            </a:r>
+            <a:r>
+              <a:rPr lang="es-AR" sz="1400" dirty="0" err="1" smtClean="0"/>
+              <a:t>Value</a:t>
+            </a:r>
+            <a:r>
+              <a:rPr lang="es-AR" sz="1400" dirty="0" smtClean="0"/>
+              <a:t> </a:t>
+            </a:r>
+            <a:r>
+              <a:rPr lang="es-AR" sz="1400" dirty="0" err="1"/>
+              <a:t>Function</a:t>
+            </a:r>
+            <a:r>
+              <a:rPr lang="es-AR" sz="1400" dirty="0"/>
+              <a:t> </a:t>
+            </a:r>
+            <a:r>
+              <a:rPr lang="es-AR" sz="1400" dirty="0" err="1"/>
+              <a:t>estimation</a:t>
+            </a:r>
+            <a:r>
+              <a:rPr lang="es-AR" sz="1400" dirty="0"/>
+              <a:t/>
+            </a:r>
+            <a:br>
+              <a:rPr lang="es-AR" sz="1400" dirty="0"/>
+            </a:br>
+            <a:r>
+              <a:rPr lang="es-AR" sz="1400" dirty="0" smtClean="0"/>
+              <a:t>	</a:t>
+            </a:r>
+            <a:r>
+              <a:rPr lang="es-AR" sz="1400" b="1" dirty="0" err="1" smtClean="0">
+                <a:solidFill>
+                  <a:schemeClr val="accent1"/>
+                </a:solidFill>
+              </a:rPr>
+              <a:t>convergence</a:t>
+            </a:r>
+            <a:r>
+              <a:rPr lang="es-AR" sz="1400" b="1" dirty="0" smtClean="0">
+                <a:solidFill>
+                  <a:schemeClr val="accent1"/>
+                </a:solidFill>
+              </a:rPr>
+              <a:t> </a:t>
+            </a:r>
+            <a:r>
+              <a:rPr lang="es-AR" sz="1400" b="1" dirty="0" err="1" smtClean="0">
+                <a:solidFill>
+                  <a:schemeClr val="accent1"/>
+                </a:solidFill>
+              </a:rPr>
+              <a:t>continues</a:t>
+            </a:r>
+            <a:r>
+              <a:rPr lang="es-AR" sz="1400" b="1" dirty="0" smtClean="0">
+                <a:solidFill>
+                  <a:schemeClr val="accent1"/>
+                </a:solidFill>
+              </a:rPr>
+              <a:t> </a:t>
+            </a:r>
+            <a:r>
+              <a:rPr lang="es-AR" sz="1400" b="1" dirty="0" err="1" smtClean="0">
+                <a:solidFill>
+                  <a:schemeClr val="accent1"/>
+                </a:solidFill>
+              </a:rPr>
+              <a:t>slowly</a:t>
+            </a:r>
+            <a:r>
+              <a:rPr lang="es-AR" sz="1400" b="1" dirty="0" smtClean="0">
+                <a:solidFill>
+                  <a:schemeClr val="accent1"/>
+                </a:solidFill>
+              </a:rPr>
+              <a:t>.</a:t>
+            </a:r>
+            <a:r>
+              <a:rPr lang="es-AR" sz="1400" dirty="0" smtClean="0"/>
+              <a:t>	      </a:t>
+            </a:r>
+            <a:r>
+              <a:rPr lang="es-AR" sz="1400" dirty="0"/>
+              <a:t>at </a:t>
+            </a:r>
+            <a:r>
+              <a:rPr lang="es-AR" sz="1400" dirty="0" err="1"/>
+              <a:t>the</a:t>
+            </a:r>
+            <a:r>
+              <a:rPr lang="es-AR" sz="1400" dirty="0"/>
+              <a:t> </a:t>
+            </a:r>
+            <a:r>
+              <a:rPr lang="es-AR" sz="1400" dirty="0" err="1"/>
+              <a:t>end</a:t>
+            </a:r>
+            <a:r>
+              <a:rPr lang="es-AR" sz="1400" dirty="0"/>
+              <a:t> of </a:t>
+            </a:r>
+            <a:r>
+              <a:rPr lang="es-AR" sz="1400" dirty="0" err="1"/>
+              <a:t>one</a:t>
+            </a:r>
+            <a:r>
+              <a:rPr lang="es-AR" sz="1400" dirty="0"/>
+              <a:t> </a:t>
+            </a:r>
+            <a:r>
+              <a:rPr lang="es-AR" sz="1400" dirty="0" err="1" smtClean="0"/>
+              <a:t>experiment</a:t>
+            </a:r>
+            <a:endParaRPr lang="es-AR" sz="1400" dirty="0" smtClean="0"/>
+          </a:p>
+          <a:p>
+            <a:endParaRPr lang="es-AR" sz="1800" dirty="0" smtClean="0"/>
+          </a:p>
+          <a:p>
+            <a:endParaRPr lang="es-AR" sz="1800" dirty="0" smtClean="0"/>
+          </a:p>
+          <a:p>
+            <a:endParaRPr lang="es-AR" sz="1800" dirty="0" smtClean="0"/>
+          </a:p>
+          <a:p>
+            <a:endParaRPr lang="es-AR" sz="1800" dirty="0" smtClean="0"/>
+          </a:p>
+          <a:p>
+            <a:endParaRPr lang="es-AR" sz="1800" dirty="0" smtClean="0"/>
+          </a:p>
+          <a:p>
+            <a:endParaRPr lang="es-AR" sz="1800" dirty="0" smtClean="0"/>
+          </a:p>
+          <a:p>
+            <a:endParaRPr lang="es-AR" sz="1800" dirty="0" smtClean="0"/>
+          </a:p>
+          <a:p>
+            <a:endParaRPr lang="es-AR" sz="1800" dirty="0" smtClean="0"/>
+          </a:p>
+          <a:p>
+            <a:endParaRPr lang="es-AR" sz="1800" dirty="0" smtClean="0"/>
+          </a:p>
+          <a:p>
+            <a:endParaRPr lang="es-AR" sz="1800" dirty="0" smtClean="0"/>
+          </a:p>
+        </p:txBody>
+      </p:sp>
+    </p:spTree>
+    <p:extLst>
+      <p:ext uri="{BB962C8B-B14F-4D97-AF65-F5344CB8AC3E}">
+        <p14:creationId xmlns:p14="http://schemas.microsoft.com/office/powerpoint/2010/main" val="3916522083"/>
+      </p:ext>
+    </p:extLst>
+  </p:cSld>
+  <p:clrMapOvr>
+    <a:masterClrMapping/>
+  </p:clrMapOvr>
+  <p:timing>
+    <p:tnLst>
+      <p:par>
+        <p:cTn id="1" dur="indefinite" restart="never" nodeType="tmRoot"/>
+      </p:par>
+    </p:tnLst>
+  </p:timing>
+</p:sld>
+</file>
+
+<file path=ppt/slides/slide17.xml><?xml version="1.0" encoding="utf-8"?>
+<p:sld xmlns:a="http://schemas.openxmlformats.org/drawingml/2006/main" xmlns:r="http://schemas.openxmlformats.org/officeDocument/2006/relationships" xmlns:p="http://schemas.openxmlformats.org/presentationml/2006/main">
+  <p:cSld>
+    <p:spTree>
+      <p:nvGrpSpPr>
+        <p:cNvPr id="1" name=""/>
+        <p:cNvGrpSpPr/>
+        <p:nvPr/>
+      </p:nvGrpSpPr>
+      <p:grpSpPr>
+        <a:xfrm>
+          <a:off x="0" y="0"/>
+          <a:ext cx="0" cy="0"/>
+          <a:chOff x="0" y="0"/>
+          <a:chExt cx="0" cy="0"/>
+        </a:xfrm>
+      </p:grpSpPr>
+      <p:pic>
+        <p:nvPicPr>
+          <p:cNvPr id="2051" name="Picture 3" descr="E:\Daniel\Projects\PhD-RL-Toulouse\projects\RL-001-MemoryManagement\results\SimulateTDLambda-Gridworld1D-v0.8-mc-ValueFunctionEstimation-adjbyepi=False,amin=0.001-Epi1000-Exp1.png"/>
+          <p:cNvPicPr>
+            <a:picLocks noChangeArrowheads="1"/>
+          </p:cNvPicPr>
+          <p:nvPr/>
+        </p:nvPicPr>
+        <p:blipFill>
+          <a:blip r:embed="rId2">
+            <a:extLst>
+              <a:ext uri="{28A0092B-C50C-407E-A947-70E740481C1C}">
+                <a14:useLocalDpi xmlns:a14="http://schemas.microsoft.com/office/drawing/2010/main" val="0"/>
+              </a:ext>
+            </a:extLst>
+          </a:blip>
+          <a:srcRect/>
+          <a:stretch>
+            <a:fillRect/>
+          </a:stretch>
+        </p:blipFill>
+        <p:spPr bwMode="auto">
+          <a:xfrm>
+            <a:off x="5666976" y="4214512"/>
+            <a:ext cx="3096000" cy="2556000"/>
+          </a:xfrm>
+          <a:prstGeom prst="rect">
+            <a:avLst/>
+          </a:prstGeom>
+          <a:noFill/>
+          <a:extLst>
+            <a:ext uri="{909E8E84-426E-40DD-AFC4-6F175D3DCCD1}">
+              <a14:hiddenFill xmlns:a14="http://schemas.microsoft.com/office/drawing/2010/main">
+                <a:solidFill>
+                  <a:srgbClr val="FFFFFF"/>
+                </a:solidFill>
+              </a14:hiddenFill>
+            </a:ext>
+          </a:extLst>
+        </p:spPr>
+      </p:pic>
+      <p:pic>
+        <p:nvPicPr>
+          <p:cNvPr id="2052" name="Picture 4" descr="E:\Daniel\Projects\PhD-RL-Toulouse\projects\RL-001-MemoryManagement\results\SimulateTDLambda-Gridworld1D-v0.8-mc-adjbyepi=False,amin=0.001-Epi1000-Exp1.png"/>
+          <p:cNvPicPr>
+            <a:picLocks noChangeAspect="1" noChangeArrowheads="1"/>
+          </p:cNvPicPr>
+          <p:nvPr/>
+        </p:nvPicPr>
+        <p:blipFill>
+          <a:blip r:embed="rId3">
+            <a:extLst>
+              <a:ext uri="{28A0092B-C50C-407E-A947-70E740481C1C}">
+                <a14:useLocalDpi xmlns:a14="http://schemas.microsoft.com/office/drawing/2010/main" val="0"/>
+              </a:ext>
+            </a:extLst>
+          </a:blip>
+          <a:srcRect/>
+          <a:stretch>
+            <a:fillRect/>
+          </a:stretch>
+        </p:blipFill>
+        <p:spPr bwMode="auto">
+          <a:xfrm>
+            <a:off x="2181939" y="4293360"/>
+            <a:ext cx="3614197" cy="2376000"/>
+          </a:xfrm>
+          <a:prstGeom prst="rect">
+            <a:avLst/>
+          </a:prstGeom>
+          <a:noFill/>
+          <a:extLst>
+            <a:ext uri="{909E8E84-426E-40DD-AFC4-6F175D3DCCD1}">
+              <a14:hiddenFill xmlns:a14="http://schemas.microsoft.com/office/drawing/2010/main">
+                <a:solidFill>
+                  <a:srgbClr val="FFFFFF"/>
+                </a:solidFill>
+              </a14:hiddenFill>
+            </a:ext>
+          </a:extLst>
+        </p:spPr>
+      </p:pic>
+      <p:pic>
+        <p:nvPicPr>
+          <p:cNvPr id="2050" name="Picture 2" descr="E:\Daniel\Projects\PhD-RL-Toulouse\projects\RL-001-MemoryManagement\results\SimulateTDLambda-Gridworld1D-v0.8-mc-adjbyepi=False,amin=0.001-Epi1000-Exp5.png"/>
+          <p:cNvPicPr>
+            <a:picLocks noChangeAspect="1" noChangeArrowheads="1"/>
+          </p:cNvPicPr>
+          <p:nvPr/>
+        </p:nvPicPr>
+        <p:blipFill>
+          <a:blip r:embed="rId4">
+            <a:extLst>
+              <a:ext uri="{28A0092B-C50C-407E-A947-70E740481C1C}">
+                <a14:useLocalDpi xmlns:a14="http://schemas.microsoft.com/office/drawing/2010/main" val="0"/>
+              </a:ext>
+            </a:extLst>
+          </a:blip>
+          <a:srcRect/>
+          <a:stretch>
+            <a:fillRect/>
+          </a:stretch>
+        </p:blipFill>
+        <p:spPr bwMode="auto">
+          <a:xfrm>
+            <a:off x="2268000" y="729080"/>
+            <a:ext cx="6840000" cy="3420000"/>
+          </a:xfrm>
+          <a:prstGeom prst="rect">
+            <a:avLst/>
+          </a:prstGeom>
+          <a:noFill/>
+          <a:extLst>
+            <a:ext uri="{909E8E84-426E-40DD-AFC4-6F175D3DCCD1}">
+              <a14:hiddenFill xmlns:a14="http://schemas.microsoft.com/office/drawing/2010/main">
+                <a:solidFill>
+                  <a:srgbClr val="FFFFFF"/>
+                </a:solidFill>
+              </a14:hiddenFill>
+            </a:ext>
+          </a:extLst>
+        </p:spPr>
+      </p:pic>
+      <p:sp>
+        <p:nvSpPr>
+          <p:cNvPr id="2" name="Title 1"/>
+          <p:cNvSpPr>
+            <a:spLocks noGrp="1"/>
+          </p:cNvSpPr>
+          <p:nvPr>
+            <p:ph type="title"/>
+          </p:nvPr>
+        </p:nvSpPr>
+        <p:spPr>
+          <a:solidFill>
+            <a:schemeClr val="accent5">
+              <a:lumMod val="20000"/>
+              <a:lumOff val="80000"/>
+            </a:schemeClr>
+          </a:solidFill>
+          <a:ln>
+            <a:solidFill>
+              <a:schemeClr val="tx1"/>
+            </a:solidFill>
+          </a:ln>
+        </p:spPr>
+        <p:txBody>
+          <a:bodyPr anchor="ctr">
+            <a:normAutofit fontScale="90000"/>
+          </a:bodyPr>
+          <a:lstStyle/>
+          <a:p>
+            <a:pPr algn="ctr"/>
+            <a:r>
+              <a:rPr lang="es-AR" dirty="0" err="1" smtClean="0"/>
+              <a:t>First-visit</a:t>
+            </a:r>
+            <a:r>
+              <a:rPr lang="es-AR" dirty="0" smtClean="0"/>
+              <a:t> MC</a:t>
+            </a:r>
+            <a:r>
+              <a:rPr lang="es-AR" dirty="0"/>
+              <a:t/>
+            </a:r>
+            <a:br>
+              <a:rPr lang="es-AR" dirty="0"/>
+            </a:br>
+            <a:r>
+              <a:rPr lang="es-AR" b="0" dirty="0" err="1" smtClean="0">
+                <a:sym typeface="Symbol"/>
+              </a:rPr>
+              <a:t>learning</a:t>
+            </a:r>
+            <a:r>
+              <a:rPr lang="es-AR" b="0" dirty="0" smtClean="0">
+                <a:sym typeface="Symbol"/>
+              </a:rPr>
+              <a:t> </a:t>
+            </a:r>
+            <a:r>
+              <a:rPr lang="es-AR" b="0" dirty="0" err="1" smtClean="0">
+                <a:sym typeface="Symbol"/>
+              </a:rPr>
+              <a:t>rate</a:t>
+            </a:r>
+            <a:r>
+              <a:rPr lang="es-AR" b="0" dirty="0" smtClean="0">
+                <a:sym typeface="Symbol"/>
+              </a:rPr>
+              <a:t> </a:t>
+            </a:r>
+            <a:r>
+              <a:rPr lang="es-AR" b="0" dirty="0" err="1" smtClean="0">
+                <a:sym typeface="Symbol"/>
+              </a:rPr>
+              <a:t>adjusted</a:t>
+            </a:r>
+            <a:r>
+              <a:rPr lang="es-AR" b="0" dirty="0" smtClean="0">
+                <a:sym typeface="Symbol"/>
+              </a:rPr>
+              <a:t> </a:t>
+            </a:r>
+            <a:r>
+              <a:rPr lang="es-AR" b="0" dirty="0" err="1" smtClean="0">
+                <a:sym typeface="Symbol"/>
+              </a:rPr>
+              <a:t>by</a:t>
+            </a:r>
+            <a:r>
+              <a:rPr lang="es-AR" b="0" dirty="0" smtClean="0">
+                <a:sym typeface="Symbol"/>
+              </a:rPr>
+              <a:t> </a:t>
+            </a:r>
+            <a:r>
+              <a:rPr lang="es-AR" b="0" dirty="0" err="1" smtClean="0">
+                <a:sym typeface="Symbol"/>
+              </a:rPr>
+              <a:t>state</a:t>
+            </a:r>
+            <a:r>
+              <a:rPr lang="es-AR" b="0" dirty="0" smtClean="0">
+                <a:sym typeface="Symbol"/>
+              </a:rPr>
+              <a:t> </a:t>
+            </a:r>
+            <a:r>
+              <a:rPr lang="es-AR" b="0" dirty="0" err="1" smtClean="0">
+                <a:sym typeface="Symbol"/>
+              </a:rPr>
+              <a:t>occupation</a:t>
+            </a:r>
+            <a:r>
+              <a:rPr lang="es-AR" b="0" dirty="0" smtClean="0">
+                <a:sym typeface="Symbol"/>
+              </a:rPr>
+              <a:t> </a:t>
+            </a:r>
+            <a:r>
+              <a:rPr lang="es-AR" b="0" dirty="0" err="1" smtClean="0">
+                <a:sym typeface="Symbol"/>
+              </a:rPr>
+              <a:t>count</a:t>
+            </a:r>
+            <a:endParaRPr lang="en-US" b="0" dirty="0"/>
+          </a:p>
+        </p:txBody>
+      </p:sp>
+      <p:sp>
+        <p:nvSpPr>
+          <p:cNvPr id="3" name="Content Placeholder 2"/>
+          <p:cNvSpPr>
+            <a:spLocks noGrp="1"/>
+          </p:cNvSpPr>
+          <p:nvPr>
+            <p:ph idx="1"/>
+          </p:nvPr>
+        </p:nvSpPr>
+        <p:spPr/>
+        <p:txBody>
+          <a:bodyPr>
+            <a:noAutofit/>
+          </a:bodyPr>
+          <a:lstStyle/>
+          <a:p>
+            <a:r>
+              <a:rPr lang="es-AR" sz="1200" dirty="0">
+                <a:hlinkClick r:id="rId5" action="ppaction://hlinksldjump"/>
+              </a:rPr>
+              <a:t>Back to </a:t>
+            </a:r>
+            <a:r>
+              <a:rPr lang="es-AR" sz="1200" dirty="0" err="1">
+                <a:hlinkClick r:id="rId5" action="ppaction://hlinksldjump"/>
+              </a:rPr>
+              <a:t>conclusions</a:t>
+            </a:r>
+            <a:r>
+              <a:rPr lang="es-AR" sz="1200" dirty="0">
+                <a:hlinkClick r:id="rId5" action="ppaction://hlinksldjump"/>
+              </a:rPr>
+              <a:t> (1)</a:t>
+            </a:r>
+            <a:r>
+              <a:rPr lang="es-AR" sz="1400" dirty="0" smtClean="0">
+                <a:hlinkClick r:id="rId6" action="ppaction://hlinksldjump"/>
+              </a:rPr>
+              <a:t/>
+            </a:r>
+            <a:br>
+              <a:rPr lang="es-AR" sz="1400" dirty="0" smtClean="0">
+                <a:hlinkClick r:id="rId6" action="ppaction://hlinksldjump"/>
+              </a:rPr>
+            </a:br>
+            <a:r>
+              <a:rPr lang="es-AR" sz="1200" dirty="0" smtClean="0">
+                <a:hlinkClick r:id="rId6" action="ppaction://hlinksldjump"/>
+              </a:rPr>
+              <a:t>Back </a:t>
+            </a:r>
+            <a:r>
+              <a:rPr lang="es-AR" sz="1200" dirty="0">
+                <a:hlinkClick r:id="rId6" action="ppaction://hlinksldjump"/>
+              </a:rPr>
+              <a:t>to </a:t>
+            </a:r>
+            <a:r>
+              <a:rPr lang="es-AR" sz="1200" dirty="0" err="1">
+                <a:hlinkClick r:id="rId6" action="ppaction://hlinksldjump"/>
+              </a:rPr>
+              <a:t>conclusions</a:t>
+            </a:r>
+            <a:r>
+              <a:rPr lang="es-AR" sz="1200" dirty="0">
+                <a:hlinkClick r:id="rId6" action="ppaction://hlinksldjump"/>
+              </a:rPr>
+              <a:t> (2</a:t>
+            </a:r>
+            <a:r>
+              <a:rPr lang="es-AR" sz="1200" dirty="0" smtClean="0">
+                <a:hlinkClick r:id="rId6" action="ppaction://hlinksldjump"/>
+              </a:rPr>
+              <a:t>)</a:t>
+            </a:r>
+            <a:r>
+              <a:rPr lang="es-AR" sz="1800" dirty="0"/>
+              <a:t>		</a:t>
+            </a:r>
+            <a:r>
+              <a:rPr lang="es-AR" sz="1800" dirty="0" err="1"/>
+              <a:t>After</a:t>
+            </a:r>
+            <a:r>
+              <a:rPr lang="es-AR" sz="1800" dirty="0"/>
+              <a:t> 1000 </a:t>
+            </a:r>
+            <a:r>
+              <a:rPr lang="es-AR" sz="1800" dirty="0" err="1"/>
+              <a:t>episodes</a:t>
+            </a:r>
+            <a:r>
+              <a:rPr lang="es-AR" sz="1800" dirty="0"/>
+              <a:t>…</a:t>
+            </a:r>
+          </a:p>
+          <a:p>
+            <a:r>
+              <a:rPr lang="es-AR" sz="1200" dirty="0">
+                <a:hlinkClick r:id="rId7" action="ppaction://hlinksldjump"/>
+              </a:rPr>
+              <a:t>Back to </a:t>
+            </a:r>
+            <a:r>
+              <a:rPr lang="es-AR" sz="1200" dirty="0" err="1">
+                <a:hlinkClick r:id="rId7" action="ppaction://hlinksldjump"/>
+              </a:rPr>
+              <a:t>conclusions</a:t>
+            </a:r>
+            <a:r>
+              <a:rPr lang="es-AR" sz="1200" dirty="0">
+                <a:hlinkClick r:id="rId7" action="ppaction://hlinksldjump"/>
+              </a:rPr>
+              <a:t> (3)</a:t>
+            </a:r>
+            <a:endParaRPr lang="es-AR" sz="1200" dirty="0"/>
+          </a:p>
+          <a:p>
+            <a:endParaRPr lang="es-AR" sz="1800" dirty="0" smtClean="0"/>
+          </a:p>
+          <a:p>
+            <a:endParaRPr lang="es-AR" sz="1800" dirty="0" smtClean="0"/>
+          </a:p>
+          <a:p>
+            <a:endParaRPr lang="es-AR" sz="1800" dirty="0" smtClean="0"/>
+          </a:p>
+          <a:p>
+            <a:endParaRPr lang="es-AR" sz="1800" dirty="0" smtClean="0"/>
+          </a:p>
+          <a:p>
+            <a:endParaRPr lang="es-AR" sz="1800" dirty="0" smtClean="0"/>
+          </a:p>
+          <a:p>
+            <a:endParaRPr lang="es-AR" sz="1800" dirty="0" smtClean="0"/>
+          </a:p>
+          <a:p>
+            <a:endParaRPr lang="es-AR" sz="1800" dirty="0" smtClean="0"/>
+          </a:p>
+          <a:p>
+            <a:endParaRPr lang="es-AR" sz="1800" dirty="0" smtClean="0"/>
+          </a:p>
+          <a:p>
+            <a:endParaRPr lang="es-AR" sz="1800" dirty="0" smtClean="0"/>
+          </a:p>
+          <a:p>
+            <a:r>
+              <a:rPr lang="es-AR" sz="1400" dirty="0"/>
+              <a:t>	RMSE in </a:t>
+            </a:r>
+            <a:r>
+              <a:rPr lang="es-AR" sz="1400" dirty="0" err="1"/>
+              <a:t>one</a:t>
+            </a:r>
+            <a:r>
+              <a:rPr lang="es-AR" sz="1400" dirty="0"/>
+              <a:t> </a:t>
+            </a:r>
+            <a:r>
+              <a:rPr lang="es-AR" sz="1400" dirty="0" err="1"/>
+              <a:t>experiment</a:t>
+            </a:r>
+            <a:r>
+              <a:rPr lang="es-AR" sz="1400" dirty="0"/>
+              <a:t>	        	         </a:t>
+            </a:r>
+            <a:r>
+              <a:rPr lang="es-AR" sz="1400" dirty="0" err="1" smtClean="0"/>
+              <a:t>Value</a:t>
+            </a:r>
+            <a:r>
+              <a:rPr lang="es-AR" sz="1400" dirty="0" smtClean="0"/>
+              <a:t> </a:t>
+            </a:r>
+            <a:r>
+              <a:rPr lang="es-AR" sz="1400" dirty="0" err="1"/>
+              <a:t>Function</a:t>
+            </a:r>
+            <a:r>
+              <a:rPr lang="es-AR" sz="1400" dirty="0"/>
+              <a:t> </a:t>
+            </a:r>
+            <a:r>
+              <a:rPr lang="es-AR" sz="1400" dirty="0" err="1"/>
+              <a:t>estimation</a:t>
+            </a:r>
+            <a:r>
+              <a:rPr lang="es-AR" sz="1400" dirty="0"/>
+              <a:t/>
+            </a:r>
+            <a:br>
+              <a:rPr lang="es-AR" sz="1400" dirty="0"/>
+            </a:br>
+            <a:r>
+              <a:rPr lang="es-AR" sz="1400" dirty="0"/>
+              <a:t>	</a:t>
+            </a:r>
+            <a:r>
+              <a:rPr lang="es-AR" sz="1400" dirty="0" err="1" smtClean="0"/>
+              <a:t>is</a:t>
+            </a:r>
+            <a:r>
+              <a:rPr lang="es-AR" sz="1400" dirty="0" smtClean="0"/>
+              <a:t> quite </a:t>
+            </a:r>
+            <a:r>
+              <a:rPr lang="es-AR" sz="1400" dirty="0" err="1" smtClean="0"/>
+              <a:t>noisy</a:t>
+            </a:r>
+            <a:r>
+              <a:rPr lang="es-AR" sz="1400" dirty="0" smtClean="0"/>
+              <a:t>.	</a:t>
+            </a:r>
+            <a:r>
+              <a:rPr lang="es-AR" sz="1400" dirty="0"/>
+              <a:t>	      at </a:t>
+            </a:r>
+            <a:r>
+              <a:rPr lang="es-AR" sz="1400" dirty="0" err="1"/>
+              <a:t>the</a:t>
+            </a:r>
+            <a:r>
+              <a:rPr lang="es-AR" sz="1400" dirty="0"/>
+              <a:t> </a:t>
+            </a:r>
+            <a:r>
+              <a:rPr lang="es-AR" sz="1400" dirty="0" err="1"/>
+              <a:t>end</a:t>
+            </a:r>
+            <a:r>
+              <a:rPr lang="es-AR" sz="1400" dirty="0"/>
+              <a:t> of </a:t>
+            </a:r>
+            <a:r>
+              <a:rPr lang="es-AR" sz="1400" dirty="0" err="1"/>
+              <a:t>one</a:t>
+            </a:r>
+            <a:r>
+              <a:rPr lang="es-AR" sz="1400" dirty="0"/>
+              <a:t> </a:t>
+            </a:r>
+            <a:r>
+              <a:rPr lang="es-AR" sz="1400" dirty="0" err="1" smtClean="0"/>
+              <a:t>experiment</a:t>
+            </a:r>
+            <a:endParaRPr lang="es-AR" sz="1400" dirty="0"/>
+          </a:p>
+        </p:txBody>
+      </p:sp>
+      <p:sp>
+        <p:nvSpPr>
+          <p:cNvPr id="4" name="Text Placeholder 3"/>
+          <p:cNvSpPr>
+            <a:spLocks noGrp="1"/>
+          </p:cNvSpPr>
+          <p:nvPr>
+            <p:ph type="body" sz="half" idx="2"/>
+          </p:nvPr>
+        </p:nvSpPr>
+        <p:spPr/>
+        <p:txBody>
+          <a:bodyPr>
+            <a:normAutofit lnSpcReduction="10000"/>
+          </a:bodyPr>
+          <a:lstStyle/>
+          <a:p>
+            <a:pPr algn="ctr"/>
+            <a:r>
+              <a:rPr lang="es-AR" dirty="0" smtClean="0">
+                <a:sym typeface="Symbol"/>
+              </a:rPr>
+              <a:t></a:t>
+            </a:r>
+            <a:r>
+              <a:rPr lang="es-AR" baseline="-25000" dirty="0" smtClean="0">
+                <a:sym typeface="Symbol"/>
+              </a:rPr>
+              <a:t>0</a:t>
+            </a:r>
+            <a:r>
+              <a:rPr lang="es-AR" dirty="0" smtClean="0">
+                <a:sym typeface="Symbol"/>
+              </a:rPr>
+              <a:t> = 0.1</a:t>
+            </a:r>
+            <a:endParaRPr lang="es-AR" dirty="0" smtClean="0"/>
+          </a:p>
+          <a:p>
+            <a:pPr algn="ctr"/>
+            <a:r>
+              <a:rPr lang="es-AR" b="1" dirty="0" smtClean="0">
+                <a:sym typeface="Symbol"/>
+              </a:rPr>
+              <a:t></a:t>
+            </a:r>
+            <a:r>
+              <a:rPr lang="es-AR" b="1" baseline="-25000" dirty="0" smtClean="0">
+                <a:sym typeface="Symbol"/>
+              </a:rPr>
+              <a:t>min</a:t>
+            </a:r>
+            <a:r>
+              <a:rPr lang="es-AR" b="1" dirty="0" smtClean="0">
+                <a:sym typeface="Symbol"/>
+              </a:rPr>
+              <a:t> = 0.001</a:t>
+            </a:r>
+          </a:p>
+          <a:p>
+            <a:endParaRPr lang="es-AR" dirty="0" smtClean="0">
+              <a:sym typeface="Symbol"/>
+            </a:endParaRPr>
+          </a:p>
+          <a:p>
+            <a:r>
+              <a:rPr lang="es-AR" b="1" dirty="0" smtClean="0">
+                <a:sym typeface="Symbol"/>
+              </a:rPr>
+              <a:t>OBSERVATIONS:</a:t>
+            </a:r>
+          </a:p>
+          <a:p>
+            <a:pPr marL="342900" indent="-342900">
+              <a:buFont typeface="+mj-lt"/>
+              <a:buAutoNum type="arabicPeriod"/>
+            </a:pPr>
+            <a:r>
+              <a:rPr lang="es-AR" dirty="0" err="1"/>
+              <a:t>The</a:t>
+            </a:r>
+            <a:r>
+              <a:rPr lang="es-AR" dirty="0"/>
+              <a:t> </a:t>
+            </a:r>
+            <a:r>
+              <a:rPr lang="es-AR" b="1" dirty="0"/>
+              <a:t>final RMSE </a:t>
+            </a:r>
+            <a:r>
+              <a:rPr lang="es-AR" dirty="0" err="1"/>
+              <a:t>after</a:t>
+            </a:r>
+            <a:r>
+              <a:rPr lang="es-AR" dirty="0"/>
+              <a:t> 1000 </a:t>
+            </a:r>
+            <a:r>
+              <a:rPr lang="es-AR" dirty="0" err="1"/>
+              <a:t>episodes</a:t>
+            </a:r>
+            <a:r>
+              <a:rPr lang="es-AR" dirty="0"/>
+              <a:t> </a:t>
+            </a:r>
+            <a:r>
+              <a:rPr lang="es-AR" dirty="0" err="1"/>
+              <a:t>is</a:t>
+            </a:r>
+            <a:r>
+              <a:rPr lang="es-AR" dirty="0"/>
+              <a:t> </a:t>
+            </a:r>
+            <a:r>
+              <a:rPr lang="es-AR" dirty="0" err="1" smtClean="0"/>
+              <a:t>slightly</a:t>
+            </a:r>
+            <a:r>
+              <a:rPr lang="es-AR" dirty="0" smtClean="0"/>
+              <a:t> </a:t>
+            </a:r>
+            <a:r>
+              <a:rPr lang="es-AR" b="1" dirty="0" err="1" smtClean="0"/>
+              <a:t>smaller</a:t>
+            </a:r>
+            <a:r>
+              <a:rPr lang="es-AR" b="1" dirty="0" smtClean="0"/>
+              <a:t> </a:t>
+            </a:r>
+            <a:r>
+              <a:rPr lang="es-AR" dirty="0" err="1"/>
+              <a:t>than</a:t>
+            </a:r>
+            <a:r>
+              <a:rPr lang="es-AR" dirty="0"/>
+              <a:t>  </a:t>
+            </a:r>
+            <a:r>
+              <a:rPr lang="es-AR" dirty="0" err="1"/>
+              <a:t>the</a:t>
+            </a:r>
+            <a:r>
+              <a:rPr lang="es-AR" dirty="0"/>
+              <a:t> case </a:t>
+            </a:r>
+            <a:r>
+              <a:rPr lang="es-AR" dirty="0" err="1"/>
+              <a:t>where</a:t>
+            </a:r>
+            <a:r>
+              <a:rPr lang="es-AR" dirty="0"/>
+              <a:t> </a:t>
+            </a:r>
+            <a:r>
+              <a:rPr lang="es-AR" dirty="0">
+                <a:sym typeface="Symbol"/>
+              </a:rPr>
+              <a:t> </a:t>
+            </a:r>
+            <a:r>
+              <a:rPr lang="es-AR" dirty="0" err="1">
+                <a:sym typeface="Symbol"/>
+              </a:rPr>
+              <a:t>is</a:t>
+            </a:r>
+            <a:r>
+              <a:rPr lang="es-AR" dirty="0">
+                <a:sym typeface="Symbol"/>
+              </a:rPr>
+              <a:t> </a:t>
+            </a:r>
+            <a:r>
+              <a:rPr lang="es-AR" dirty="0" err="1" smtClean="0">
+                <a:sym typeface="Symbol"/>
+              </a:rPr>
+              <a:t>allowed</a:t>
+            </a:r>
+            <a:r>
+              <a:rPr lang="es-AR" dirty="0" smtClean="0">
+                <a:sym typeface="Symbol"/>
+              </a:rPr>
+              <a:t> to </a:t>
+            </a:r>
+            <a:r>
+              <a:rPr lang="es-AR" dirty="0" err="1" smtClean="0">
+                <a:sym typeface="Symbol"/>
+              </a:rPr>
+              <a:t>decrease</a:t>
+            </a:r>
+            <a:r>
+              <a:rPr lang="es-AR" dirty="0" smtClean="0">
+                <a:sym typeface="Symbol"/>
+              </a:rPr>
+              <a:t> </a:t>
+            </a:r>
+            <a:r>
+              <a:rPr lang="es-AR" dirty="0" err="1" smtClean="0">
+                <a:sym typeface="Symbol"/>
+              </a:rPr>
+              <a:t>freely</a:t>
+            </a:r>
+            <a:r>
+              <a:rPr lang="es-AR" dirty="0" smtClean="0">
+                <a:sym typeface="Symbol"/>
+              </a:rPr>
+              <a:t>, and </a:t>
+            </a:r>
+            <a:r>
+              <a:rPr lang="es-AR" b="1" dirty="0" err="1" smtClean="0">
+                <a:sym typeface="Symbol"/>
+              </a:rPr>
+              <a:t>convergence</a:t>
+            </a:r>
+            <a:r>
+              <a:rPr lang="es-AR" b="1" dirty="0" smtClean="0">
+                <a:sym typeface="Symbol"/>
+              </a:rPr>
+              <a:t> </a:t>
+            </a:r>
+            <a:r>
+              <a:rPr lang="es-AR" b="1" dirty="0" err="1" smtClean="0">
+                <a:sym typeface="Symbol"/>
+              </a:rPr>
+              <a:t>is</a:t>
+            </a:r>
+            <a:r>
+              <a:rPr lang="es-AR" b="1" dirty="0" smtClean="0">
+                <a:sym typeface="Symbol"/>
+              </a:rPr>
+              <a:t> </a:t>
+            </a:r>
+            <a:r>
+              <a:rPr lang="es-AR" b="1" dirty="0" err="1" smtClean="0">
+                <a:sym typeface="Symbol"/>
+              </a:rPr>
+              <a:t>not</a:t>
+            </a:r>
+            <a:r>
+              <a:rPr lang="es-AR" b="1" dirty="0" smtClean="0">
+                <a:sym typeface="Symbol"/>
+              </a:rPr>
+              <a:t> “</a:t>
+            </a:r>
+            <a:r>
+              <a:rPr lang="es-AR" b="1" dirty="0" err="1" smtClean="0">
+                <a:sym typeface="Symbol"/>
+              </a:rPr>
+              <a:t>noisy</a:t>
+            </a:r>
+            <a:r>
+              <a:rPr lang="es-AR" b="1" dirty="0" smtClean="0">
+                <a:sym typeface="Symbol"/>
+              </a:rPr>
+              <a:t>”</a:t>
+            </a:r>
+            <a:r>
+              <a:rPr lang="es-AR" dirty="0" smtClean="0">
+                <a:sym typeface="Symbol"/>
+              </a:rPr>
+              <a:t> as </a:t>
+            </a:r>
+            <a:r>
+              <a:rPr lang="es-AR" dirty="0" err="1" smtClean="0">
+                <a:sym typeface="Symbol"/>
+              </a:rPr>
+              <a:t>is</a:t>
+            </a:r>
+            <a:r>
+              <a:rPr lang="es-AR" dirty="0" smtClean="0">
+                <a:sym typeface="Symbol"/>
+              </a:rPr>
+              <a:t> </a:t>
+            </a:r>
+            <a:r>
+              <a:rPr lang="es-AR" dirty="0" err="1" smtClean="0">
+                <a:sym typeface="Symbol"/>
+              </a:rPr>
+              <a:t>the</a:t>
+            </a:r>
+            <a:r>
+              <a:rPr lang="es-AR" dirty="0" smtClean="0">
+                <a:sym typeface="Symbol"/>
+              </a:rPr>
+              <a:t> case in </a:t>
+            </a:r>
+            <a:r>
+              <a:rPr lang="es-AR" dirty="0" err="1" smtClean="0">
+                <a:sym typeface="Symbol"/>
+              </a:rPr>
+              <a:t>the</a:t>
+            </a:r>
+            <a:r>
+              <a:rPr lang="es-AR" dirty="0" smtClean="0">
+                <a:sym typeface="Symbol"/>
+              </a:rPr>
+              <a:t> </a:t>
+            </a:r>
+            <a:r>
+              <a:rPr lang="es-AR" dirty="0" err="1" smtClean="0">
+                <a:sym typeface="Symbol"/>
+              </a:rPr>
+              <a:t>every-visit</a:t>
+            </a:r>
+            <a:r>
+              <a:rPr lang="es-AR" dirty="0" smtClean="0">
+                <a:sym typeface="Symbol"/>
+              </a:rPr>
+              <a:t> MC.</a:t>
+            </a:r>
+            <a:endParaRPr lang="es-AR" dirty="0">
+              <a:sym typeface="Symbol"/>
+            </a:endParaRPr>
+          </a:p>
+          <a:p>
+            <a:pPr marL="342900" indent="-342900">
+              <a:buFont typeface="+mj-lt"/>
+              <a:buAutoNum type="arabicPeriod"/>
+            </a:pPr>
+            <a:endParaRPr lang="es-AR" dirty="0">
+              <a:sym typeface="Symbol"/>
+            </a:endParaRPr>
+          </a:p>
+          <a:p>
+            <a:pPr marL="342900" indent="-342900">
+              <a:buFont typeface="+mj-lt"/>
+              <a:buAutoNum type="arabicPeriod"/>
+            </a:pPr>
+            <a:r>
+              <a:rPr lang="es-AR" dirty="0" err="1">
+                <a:sym typeface="Symbol"/>
+              </a:rPr>
+              <a:t>The</a:t>
+            </a:r>
+            <a:r>
+              <a:rPr lang="es-AR" dirty="0">
+                <a:sym typeface="Symbol"/>
+              </a:rPr>
+              <a:t> </a:t>
+            </a:r>
+            <a:r>
+              <a:rPr lang="es-AR" b="1" dirty="0" err="1">
+                <a:sym typeface="Symbol"/>
+              </a:rPr>
+              <a:t>convergence</a:t>
+            </a:r>
+            <a:r>
+              <a:rPr lang="es-AR" b="1" dirty="0">
+                <a:sym typeface="Symbol"/>
+              </a:rPr>
+              <a:t> </a:t>
+            </a:r>
+            <a:r>
+              <a:rPr lang="es-AR" b="1" dirty="0" err="1">
+                <a:sym typeface="Symbol"/>
+              </a:rPr>
+              <a:t>rate</a:t>
+            </a:r>
+            <a:r>
+              <a:rPr lang="es-AR" b="1" dirty="0">
+                <a:sym typeface="Symbol"/>
+              </a:rPr>
+              <a:t> </a:t>
+            </a:r>
+            <a:r>
+              <a:rPr lang="es-AR" dirty="0" err="1">
+                <a:sym typeface="Symbol"/>
+              </a:rPr>
+              <a:t>is</a:t>
+            </a:r>
+            <a:r>
+              <a:rPr lang="es-AR" dirty="0">
+                <a:sym typeface="Symbol"/>
+              </a:rPr>
+              <a:t> ~ T</a:t>
+            </a:r>
+            <a:r>
+              <a:rPr lang="es-AR" baseline="30000" dirty="0">
+                <a:sym typeface="Symbol"/>
+              </a:rPr>
+              <a:t>-1/4</a:t>
+            </a:r>
+            <a:r>
+              <a:rPr lang="es-AR" dirty="0" smtClean="0">
+                <a:sym typeface="Symbol"/>
+              </a:rPr>
+              <a:t>.</a:t>
+            </a:r>
+          </a:p>
+          <a:p>
+            <a:pPr marL="342900" indent="-342900">
+              <a:buFont typeface="+mj-lt"/>
+              <a:buAutoNum type="arabicPeriod"/>
+            </a:pPr>
+            <a:endParaRPr lang="es-AR" dirty="0">
+              <a:sym typeface="Symbol"/>
+            </a:endParaRPr>
+          </a:p>
+          <a:p>
+            <a:pPr marL="342900" indent="-342900">
+              <a:buFont typeface="+mj-lt"/>
+              <a:buAutoNum type="arabicPeriod"/>
+            </a:pPr>
+            <a:r>
+              <a:rPr lang="es-AR" dirty="0" err="1">
+                <a:sym typeface="Symbol"/>
+              </a:rPr>
+              <a:t>The</a:t>
+            </a:r>
+            <a:r>
+              <a:rPr lang="es-AR" dirty="0">
+                <a:sym typeface="Symbol"/>
+              </a:rPr>
+              <a:t> </a:t>
+            </a:r>
+            <a:r>
+              <a:rPr lang="es-AR" dirty="0" err="1">
+                <a:sym typeface="Symbol"/>
+              </a:rPr>
+              <a:t>estimated</a:t>
+            </a:r>
+            <a:r>
+              <a:rPr lang="es-AR" dirty="0">
+                <a:sym typeface="Symbol"/>
+              </a:rPr>
+              <a:t> </a:t>
+            </a:r>
+            <a:r>
+              <a:rPr lang="es-AR" dirty="0" err="1">
+                <a:sym typeface="Symbol"/>
+              </a:rPr>
+              <a:t>state</a:t>
+            </a:r>
+            <a:r>
+              <a:rPr lang="es-AR" dirty="0">
+                <a:sym typeface="Symbol"/>
+              </a:rPr>
+              <a:t> </a:t>
+            </a:r>
+            <a:r>
+              <a:rPr lang="es-AR" dirty="0" err="1">
+                <a:sym typeface="Symbol"/>
+              </a:rPr>
+              <a:t>value</a:t>
+            </a:r>
+            <a:r>
+              <a:rPr lang="es-AR" dirty="0">
+                <a:sym typeface="Symbol"/>
+              </a:rPr>
+              <a:t> </a:t>
+            </a:r>
+            <a:r>
+              <a:rPr lang="es-AR" dirty="0" err="1">
+                <a:sym typeface="Symbol"/>
+              </a:rPr>
+              <a:t>function</a:t>
+            </a:r>
+            <a:r>
+              <a:rPr lang="es-AR" dirty="0">
+                <a:sym typeface="Symbol"/>
+              </a:rPr>
+              <a:t> </a:t>
+            </a:r>
+            <a:r>
+              <a:rPr lang="es-AR" dirty="0" err="1">
+                <a:sym typeface="Symbol"/>
+              </a:rPr>
+              <a:t>is</a:t>
+            </a:r>
+            <a:r>
+              <a:rPr lang="es-AR" dirty="0">
+                <a:sym typeface="Symbol"/>
+              </a:rPr>
+              <a:t> </a:t>
+            </a:r>
+            <a:r>
+              <a:rPr lang="es-AR" b="1" dirty="0" err="1">
+                <a:solidFill>
+                  <a:srgbClr val="00B050"/>
+                </a:solidFill>
+                <a:sym typeface="Symbol"/>
+              </a:rPr>
+              <a:t>accetable</a:t>
+            </a:r>
+            <a:r>
+              <a:rPr lang="es-AR" dirty="0" smtClean="0">
+                <a:sym typeface="Symbol"/>
+              </a:rPr>
+              <a:t>.</a:t>
+            </a:r>
+            <a:endParaRPr lang="es-AR" dirty="0">
+              <a:sym typeface="Symbol"/>
+            </a:endParaRPr>
+          </a:p>
+        </p:txBody>
+      </p:sp>
+      <p:sp>
+        <p:nvSpPr>
+          <p:cNvPr id="5" name="Slide Number Placeholder 4"/>
+          <p:cNvSpPr>
+            <a:spLocks noGrp="1"/>
+          </p:cNvSpPr>
+          <p:nvPr>
+            <p:ph type="sldNum" sz="quarter" idx="12"/>
+          </p:nvPr>
+        </p:nvSpPr>
+        <p:spPr/>
+        <p:txBody>
+          <a:bodyPr/>
+          <a:lstStyle/>
+          <a:p>
+            <a:fld id="{75E05CB0-B7BE-45F8-B32B-236A56ACDA27}" type="slidenum">
+              <a:rPr lang="en-US" smtClean="0"/>
+              <a:t>17</a:t>
+            </a:fld>
+            <a:endParaRPr lang="en-US"/>
+          </a:p>
+        </p:txBody>
+      </p:sp>
+    </p:spTree>
+    <p:extLst>
+      <p:ext uri="{BB962C8B-B14F-4D97-AF65-F5344CB8AC3E}">
+        <p14:creationId xmlns:p14="http://schemas.microsoft.com/office/powerpoint/2010/main" val="2052777664"/>
+      </p:ext>
+    </p:extLst>
+  </p:cSld>
+  <p:clrMapOvr>
+    <a:masterClrMapping/>
+  </p:clrMapOvr>
+  <p:timing>
+    <p:tnLst>
+      <p:par>
+        <p:cTn id="1" dur="indefinite" restart="never" nodeType="tmRoot"/>
+      </p:par>
+    </p:tnLst>
+  </p:timing>
+</p:sld>
+</file>
+
+<file path=ppt/slides/slide18.xml><?xml version="1.0" encoding="utf-8"?>
 <p:sld xmlns:a="http://schemas.openxmlformats.org/drawingml/2006/main" xmlns:r="http://schemas.openxmlformats.org/officeDocument/2006/relationships" xmlns:p="http://schemas.openxmlformats.org/presentationml/2006/main">
   <p:cSld>
     <p:spTree>
@@ -10894,7 +13008,15 @@
             </a:r>
             <a:r>
               <a:rPr lang="en-US" dirty="0" smtClean="0"/>
-              <a:t>adjustment by state occupation count, an analysis of the RMSE variability across the five experiments was carried out.</a:t>
+              <a:t>adjustment by state occupation count in the </a:t>
+            </a:r>
+            <a:r>
+              <a:rPr lang="en-US" smtClean="0"/>
+              <a:t>every-visit case</a:t>
+            </a:r>
+            <a:r>
+              <a:rPr lang="en-US" dirty="0" smtClean="0"/>
+              <a:t>, an analysis of the RMSE variability across the five experiments was carried out.</a:t>
             </a:r>
           </a:p>
           <a:p>
@@ -10972,7 +13094,7 @@
           <a:p>
             <a:fld id="{75E05CB0-B7BE-45F8-B32B-236A56ACDA27}" type="slidenum">
               <a:rPr lang="en-US" smtClean="0"/>
-              <a:t>16</a:t>
+              <a:t>18</a:t>
             </a:fld>
             <a:endParaRPr lang="en-US"/>
           </a:p>
@@ -11026,7 +13148,7 @@
         <p:spPr>
           <a:xfrm>
             <a:off x="5940152" y="3941440"/>
-            <a:ext cx="1296144" cy="369332"/>
+            <a:ext cx="1656184" cy="369332"/>
           </a:xfrm>
           <a:prstGeom prst="rect">
             <a:avLst/>
@@ -11046,7 +13168,7 @@
                   <a:schemeClr val="tx2"/>
                 </a:solidFill>
               </a:rPr>
-              <a:t>MC</a:t>
+              <a:t>Every-visit MC</a:t>
             </a:r>
             <a:endParaRPr lang="en-US" b="1" dirty="0">
               <a:solidFill>
@@ -11076,7 +13198,7 @@
 </p:sld>
 </file>
 
-<file path=ppt/slides/slide17.xml><?xml version="1.0" encoding="utf-8"?>
+<file path=ppt/slides/slide19.xml><?xml version="1.0" encoding="utf-8"?>
 <p:sld xmlns:a="http://schemas.openxmlformats.org/drawingml/2006/main" xmlns:r="http://schemas.openxmlformats.org/officeDocument/2006/relationships" xmlns:p="http://schemas.openxmlformats.org/presentationml/2006/main">
   <p:cSld>
     <p:spTree>
@@ -11292,7 +13414,7 @@
           <a:p>
             <a:fld id="{75E05CB0-B7BE-45F8-B32B-236A56ACDA27}" type="slidenum">
               <a:rPr lang="en-US" smtClean="0"/>
-              <a:t>17</a:t>
+              <a:t>19</a:t>
             </a:fld>
             <a:endParaRPr lang="en-US"/>
           </a:p>
@@ -11428,7 +13550,7 @@
         <p:spPr>
           <a:xfrm>
             <a:off x="5940152" y="3941440"/>
-            <a:ext cx="1296144" cy="369332"/>
+            <a:ext cx="1584176" cy="369332"/>
           </a:xfrm>
           <a:prstGeom prst="rect">
             <a:avLst/>
@@ -11448,7 +13570,7 @@
                   <a:schemeClr val="tx2"/>
                 </a:solidFill>
               </a:rPr>
-              <a:t>MC</a:t>
+              <a:t>Every-visit MC</a:t>
             </a:r>
             <a:endParaRPr lang="en-US" b="1" dirty="0">
               <a:solidFill>
@@ -11534,8 +13656,8 @@
           </a:p>
         </p:txBody>
       </p:sp>
-      <mc:AlternateContent xmlns:mc="http://schemas.openxmlformats.org/markup-compatibility/2006">
-        <mc:Choice xmlns:a14="http://schemas.microsoft.com/office/drawing/2010/main" Requires="a14">
+      <mc:AlternateContent xmlns:mc="http://schemas.openxmlformats.org/markup-compatibility/2006" xmlns:a14="http://schemas.microsoft.com/office/drawing/2010/main">
+        <mc:Choice Requires="a14">
           <p:sp>
             <p:nvSpPr>
               <p:cNvPr id="3" name="Content Placeholder 2"/>
@@ -13006,7 +15128,7 @@
             </p:txBody>
           </p:sp>
         </mc:Choice>
-        <mc:Fallback>
+        <mc:Fallback xmlns="">
           <p:sp>
             <p:nvSpPr>
               <p:cNvPr id="3" name="Content Placeholder 2"/>
@@ -13154,8 +15276,8 @@
           </a:p>
         </p:txBody>
       </p:sp>
-      <mc:AlternateContent xmlns:mc="http://schemas.openxmlformats.org/markup-compatibility/2006">
-        <mc:Choice xmlns:a14="http://schemas.microsoft.com/office/drawing/2010/main" Requires="a14">
+      <mc:AlternateContent xmlns:mc="http://schemas.openxmlformats.org/markup-compatibility/2006" xmlns:a14="http://schemas.microsoft.com/office/drawing/2010/main">
+        <mc:Choice Requires="a14">
           <p:sp>
             <p:nvSpPr>
               <p:cNvPr id="3" name="Content Placeholder 2"/>
@@ -14622,12 +16744,6 @@
                   </a:rPr>
                   <a:t> of time.</a:t>
                 </a:r>
-                <a:r>
-                  <a:rPr lang="es-AR" sz="1200" dirty="0" smtClean="0">
-                    <a:sym typeface="Symbol"/>
-                  </a:rPr>
-                  <a:t/>
-                </a:r>
                 <a:br>
                   <a:rPr lang="es-AR" sz="1200" dirty="0" smtClean="0">
                     <a:sym typeface="Symbol"/>
@@ -15356,7 +17472,7 @@
             </p:txBody>
           </p:sp>
         </mc:Choice>
-        <mc:Fallback>
+        <mc:Fallback xmlns="">
           <p:sp>
             <p:nvSpPr>
               <p:cNvPr id="3" name="Content Placeholder 2"/>
@@ -15535,49 +17651,25 @@
               <a:rPr lang="en-US" dirty="0" smtClean="0">
                 <a:sym typeface="Symbol"/>
               </a:rPr>
-              <a:t>Both TD(0) and MC seem to converge to the tru</a:t>
+              <a:t>Both TD(0) and MC seem to converge to the true state value function in </a:t>
+            </a:r>
+            <a:r>
+              <a:rPr lang="en-US" i="1" dirty="0" smtClean="0">
+                <a:sym typeface="Symbol"/>
+              </a:rPr>
+              <a:t>a “reasonable” amount of time</a:t>
             </a:r>
             <a:r>
               <a:rPr lang="en-US" dirty="0" smtClean="0">
                 <a:sym typeface="Symbol"/>
               </a:rPr>
-              <a:t>e state value function </a:t>
-            </a:r>
-            <a:r>
-              <a:rPr lang="en-US" dirty="0" smtClean="0">
-                <a:sym typeface="Symbol"/>
-              </a:rPr>
-              <a:t>in </a:t>
-            </a:r>
-            <a:r>
-              <a:rPr lang="en-US" i="1" dirty="0" smtClean="0">
-                <a:sym typeface="Symbol"/>
-              </a:rPr>
-              <a:t>a “reasonable” amount of time</a:t>
-            </a:r>
-            <a:r>
-              <a:rPr lang="en-US" dirty="0" smtClean="0">
-                <a:sym typeface="Symbol"/>
-              </a:rPr>
               <a:t> </a:t>
             </a:r>
             <a:r>
               <a:rPr lang="en-US" b="1" dirty="0" smtClean="0">
                 <a:sym typeface="Symbol"/>
               </a:rPr>
-              <a:t>as </a:t>
-            </a:r>
-            <a:r>
-              <a:rPr lang="en-US" b="1" dirty="0" smtClean="0">
-                <a:sym typeface="Symbol"/>
-              </a:rPr>
-              <a:t>long as the learning rate  does not decrease too </a:t>
-            </a:r>
-            <a:r>
-              <a:rPr lang="en-US" b="1" dirty="0" smtClean="0">
-                <a:sym typeface="Symbol"/>
-              </a:rPr>
-              <a:t>aggressively</a:t>
+              <a:t>as long as the learning rate  does not decrease too aggressively</a:t>
             </a:r>
             <a:r>
               <a:rPr lang="en-US" dirty="0">
@@ -15645,9 +17737,6 @@
               </a:rPr>
               <a:t>.</a:t>
             </a:r>
-            <a:endParaRPr lang="en-US" dirty="0" smtClean="0">
-              <a:sym typeface="Symbol"/>
-            </a:endParaRPr>
           </a:p>
           <a:p>
             <a:pPr marL="514350" indent="-514350">
@@ -15667,31 +17756,7 @@
               <a:rPr lang="en-US" b="1" dirty="0" smtClean="0">
                 <a:sym typeface="Symbol"/>
               </a:rPr>
-              <a:t>TD(0</a:t>
-            </a:r>
-            <a:r>
-              <a:rPr lang="en-US" b="1" dirty="0" smtClean="0">
-                <a:sym typeface="Symbol"/>
-              </a:rPr>
-              <a:t>) yields more </a:t>
-            </a:r>
-            <a:r>
-              <a:rPr lang="en-US" b="1" dirty="0" smtClean="0">
-                <a:sym typeface="Symbol"/>
-              </a:rPr>
-              <a:t>accurate and reliable estimations </a:t>
-            </a:r>
-            <a:r>
-              <a:rPr lang="en-US" b="1" dirty="0" smtClean="0">
-                <a:sym typeface="Symbol"/>
-              </a:rPr>
-              <a:t>than </a:t>
-            </a:r>
-            <a:r>
-              <a:rPr lang="en-US" b="1" dirty="0" smtClean="0">
-                <a:sym typeface="Symbol"/>
-              </a:rPr>
-              <a:t>MC</a:t>
+              <a:t>TD(0) yields more accurate and reliable estimations than MC</a:t>
             </a:r>
             <a:r>
               <a:rPr lang="en-US" dirty="0">
@@ -15881,11 +17946,7 @@
             </a:r>
             <a:r>
               <a:rPr lang="es-AR" dirty="0" err="1" smtClean="0"/>
-              <a:t>c</a:t>
-            </a:r>
-            <a:r>
-              <a:rPr lang="es-AR" dirty="0" err="1" smtClean="0"/>
-              <a:t>onvergence</a:t>
+              <a:t>convergence</a:t>
             </a:r>
             <a:r>
               <a:rPr lang="es-AR" dirty="0" smtClean="0"/>
@@ -16549,13 +18610,7 @@
               <a:rPr lang="en-US" b="1" dirty="0" smtClean="0">
                 <a:sym typeface="Symbol"/>
               </a:rPr>
-              <a:t>Analysis of the two decrease strategies for </a:t>
-            </a:r>
-            <a:r>
-              <a:rPr lang="en-US" b="1" dirty="0" smtClean="0">
-                <a:sym typeface="Symbol"/>
-              </a:rPr>
-              <a:t></a:t>
+              <a:t>Analysis of the two decrease strategies for </a:t>
             </a:r>
             <a:br>
               <a:rPr lang="en-US" b="1" dirty="0" smtClean="0">
@@ -16592,19 +18647,7 @@
               <a:rPr lang="en-US" dirty="0" smtClean="0">
                 <a:sym typeface="Symbol"/>
               </a:rPr>
-              <a:t>The following convergence </a:t>
-            </a:r>
-            <a:r>
-              <a:rPr lang="en-US" dirty="0" smtClean="0">
-                <a:sym typeface="Symbol"/>
-              </a:rPr>
-              <a:t>rates </a:t>
-            </a:r>
-            <a:r>
-              <a:rPr lang="en-US" dirty="0" smtClean="0">
-                <a:sym typeface="Symbol"/>
-              </a:rPr>
-              <a:t>are observed for each </a:t>
+              <a:t>The following convergence rates are observed for each </a:t>
             </a:r>
             <a:r>
               <a:rPr lang="en-US" dirty="0">
@@ -16661,9 +18704,6 @@
               </a:rPr>
               <a:t>number)</a:t>
             </a:r>
-            <a:endParaRPr lang="en-US" i="1" dirty="0" smtClean="0">
-              <a:sym typeface="Symbol"/>
-            </a:endParaRPr>
           </a:p>
           <a:p>
             <a:pPr marL="514350" indent="-514350">
@@ -16818,19 +18858,7 @@
                         <a:rPr lang="en-US" sz="1600" dirty="0" smtClean="0">
                           <a:sym typeface="Symbol"/>
                         </a:rPr>
-                        <a:t>Controlled decrease (</a:t>
-                      </a:r>
-                      <a:r>
-                        <a:rPr lang="en-US" sz="1600" dirty="0" smtClean="0">
-                          <a:sym typeface="Symbol"/>
-                        </a:rPr>
-                        <a:t>  0.001</a:t>
-                      </a:r>
-                      <a:r>
-                        <a:rPr lang="en-US" sz="1600" dirty="0" smtClean="0">
-                          <a:sym typeface="Symbol"/>
-                        </a:rPr>
-                        <a:t>)</a:t>
+                        <a:t>Controlled decrease (  0.001)</a:t>
                       </a:r>
                       <a:endParaRPr lang="en-US" sz="1600" dirty="0"/>
                     </a:p>
@@ -17288,13 +19316,7 @@
                         <a:rPr lang="en-US" sz="1600" dirty="0" smtClean="0">
                           <a:sym typeface="Symbol"/>
                         </a:rPr>
-                        <a:t>Free </a:t>
-                      </a:r>
-                      <a:r>
-                        <a:rPr lang="en-US" sz="1600" dirty="0" smtClean="0">
-                          <a:sym typeface="Symbol"/>
-                        </a:rPr>
-                        <a:t>decrease</a:t>
+                        <a:t>Free decrease</a:t>
                       </a:r>
                     </a:p>
                     <a:p>
@@ -17360,19 +19382,7 @@
                         <a:rPr lang="en-US" sz="1600" dirty="0" smtClean="0">
                           <a:sym typeface="Symbol"/>
                         </a:rPr>
-                        <a:t>(</a:t>
-                      </a:r>
-                      <a:r>
-                        <a:rPr lang="en-US" sz="1600" dirty="0" smtClean="0">
-                          <a:sym typeface="Symbol"/>
-                        </a:rPr>
-                        <a:t>  0.008</a:t>
-                      </a:r>
-                      <a:r>
-                        <a:rPr lang="en-US" sz="1600" dirty="0" smtClean="0">
-                          <a:sym typeface="Symbol"/>
-                        </a:rPr>
-                        <a:t>)</a:t>
+                        <a:t>(  0.008)</a:t>
                       </a:r>
                       <a:endParaRPr lang="en-US" sz="1600" dirty="0"/>
                     </a:p>
@@ -18156,13 +20166,7 @@
               <a:rPr lang="en-US" i="1" dirty="0" smtClean="0">
                 <a:sym typeface="Symbol"/>
               </a:rPr>
-              <a:t>decrease of </a:t>
-            </a:r>
-            <a:r>
-              <a:rPr lang="en-US" i="1" dirty="0" smtClean="0">
-                <a:sym typeface="Symbol"/>
-              </a:rPr>
-              <a:t></a:t>
+              <a:t>decrease of </a:t>
             </a:r>
             <a:r>
               <a:rPr lang="en-US" dirty="0" smtClean="0">
@@ -18755,9 +20759,6 @@
               </a:rPr>
               <a:t>.</a:t>
             </a:r>
-            <a:endParaRPr lang="es-AR" dirty="0" smtClean="0">
-              <a:sym typeface="Symbol"/>
-            </a:endParaRPr>
           </a:p>
           <a:p>
             <a:pPr marL="342900" indent="-342900">
@@ -18935,9 +20936,6 @@
               </a:rPr>
               <a:t>!).</a:t>
             </a:r>
-            <a:endParaRPr lang="es-AR" dirty="0" smtClean="0">
-              <a:sym typeface="Symbol"/>
-            </a:endParaRPr>
           </a:p>
           <a:p>
             <a:pPr marL="342900" indent="-342900">

</xml_diff>